<commit_message>
Added full  command log to the course Commands.txt and changed order in ppt
</commit_message>
<xml_diff>
--- a/WorkStuff/Courses/Git/Git_Best_Practices/Git_Best_Practices.pptx
+++ b/WorkStuff/Courses/Git/Git_Best_Practices/Git_Best_Practices.pptx
@@ -11,12 +11,12 @@
     <p:sldId id="256" r:id="rId2"/>
     <p:sldId id="257" r:id="rId3"/>
     <p:sldId id="258" r:id="rId4"/>
-    <p:sldId id="288" r:id="rId5"/>
-    <p:sldId id="289" r:id="rId6"/>
-    <p:sldId id="290" r:id="rId7"/>
-    <p:sldId id="291" r:id="rId8"/>
-    <p:sldId id="292" r:id="rId9"/>
-    <p:sldId id="293" r:id="rId10"/>
+    <p:sldId id="291" r:id="rId5"/>
+    <p:sldId id="288" r:id="rId6"/>
+    <p:sldId id="289" r:id="rId7"/>
+    <p:sldId id="293" r:id="rId8"/>
+    <p:sldId id="290" r:id="rId9"/>
+    <p:sldId id="292" r:id="rId10"/>
     <p:sldId id="294" r:id="rId11"/>
     <p:sldId id="298" r:id="rId12"/>
   </p:sldIdLst>
@@ -24,19 +24,19 @@
   <p:notesSz cx="6934200" cy="9232900"/>
   <p:embeddedFontLst>
     <p:embeddedFont>
-      <p:font typeface="Source Code Pro" panose="020B0604020202020204" charset="0"/>
+      <p:font typeface="Merriweather" panose="020B0604020202020204" charset="0"/>
       <p:regular r:id="rId14"/>
       <p:bold r:id="rId15"/>
-    </p:embeddedFont>
-    <p:embeddedFont>
-      <p:font typeface="Merriweather" panose="020B0604020202020204" charset="0"/>
-      <p:regular r:id="rId16"/>
-      <p:bold r:id="rId17"/>
-      <p:italic r:id="rId18"/>
-      <p:boldItalic r:id="rId19"/>
+      <p:italic r:id="rId16"/>
+      <p:boldItalic r:id="rId17"/>
     </p:embeddedFont>
     <p:embeddedFont>
       <p:font typeface="Amatic SC" panose="020B0604020202020204" charset="-79"/>
+      <p:regular r:id="rId18"/>
+      <p:bold r:id="rId19"/>
+    </p:embeddedFont>
+    <p:embeddedFont>
+      <p:font typeface="Source Code Pro" panose="020B0604020202020204" charset="0"/>
       <p:regular r:id="rId20"/>
       <p:bold r:id="rId21"/>
     </p:embeddedFont>
@@ -1763,7 +1763,7 @@
   <p:cSld>
     <p:spTree>
       <p:nvGrpSpPr>
-        <p:cNvPr id="1" name="Shape 553"/>
+        <p:cNvPr id="1" name="Shape 577"/>
         <p:cNvGrpSpPr/>
         <p:nvPr/>
       </p:nvGrpSpPr>
@@ -1777,7 +1777,7 @@
       </p:grpSpPr>
       <p:sp>
         <p:nvSpPr>
-          <p:cNvPr id="554" name="Shape 554"/>
+          <p:cNvPr id="578" name="Shape 578"/>
           <p:cNvSpPr txBox="1">
             <a:spLocks noGrp="1"/>
           </p:cNvSpPr>
@@ -1812,7 +1812,7 @@
       </p:sp>
       <p:sp>
         <p:nvSpPr>
-          <p:cNvPr id="555" name="Shape 555"/>
+          <p:cNvPr id="579" name="Shape 579"/>
           <p:cNvSpPr>
             <a:spLocks noGrp="1" noRot="1" noChangeAspect="1"/>
           </p:cNvSpPr>
@@ -1864,7 +1864,7 @@
   <p:cSld>
     <p:spTree>
       <p:nvGrpSpPr>
-        <p:cNvPr id="1" name="Shape 561"/>
+        <p:cNvPr id="1" name="Shape 553"/>
         <p:cNvGrpSpPr/>
         <p:nvPr/>
       </p:nvGrpSpPr>
@@ -1878,7 +1878,7 @@
       </p:grpSpPr>
       <p:sp>
         <p:nvSpPr>
-          <p:cNvPr id="562" name="Shape 562"/>
+          <p:cNvPr id="554" name="Shape 554"/>
           <p:cNvSpPr txBox="1">
             <a:spLocks noGrp="1"/>
           </p:cNvSpPr>
@@ -1913,7 +1913,7 @@
       </p:sp>
       <p:sp>
         <p:nvSpPr>
-          <p:cNvPr id="563" name="Shape 563"/>
+          <p:cNvPr id="555" name="Shape 555"/>
           <p:cNvSpPr>
             <a:spLocks noGrp="1" noRot="1" noChangeAspect="1"/>
           </p:cNvSpPr>
@@ -1965,7 +1965,7 @@
   <p:cSld>
     <p:spTree>
       <p:nvGrpSpPr>
-        <p:cNvPr id="1" name="Shape 569"/>
+        <p:cNvPr id="1" name="Shape 561"/>
         <p:cNvGrpSpPr/>
         <p:nvPr/>
       </p:nvGrpSpPr>
@@ -1979,7 +1979,42 @@
       </p:grpSpPr>
       <p:sp>
         <p:nvSpPr>
-          <p:cNvPr id="570" name="Shape 570"/>
+          <p:cNvPr id="562" name="Shape 562"/>
+          <p:cNvSpPr txBox="1">
+            <a:spLocks noGrp="1"/>
+          </p:cNvSpPr>
+          <p:nvPr>
+            <p:ph type="body" idx="1"/>
+          </p:nvPr>
+        </p:nvSpPr>
+        <p:spPr>
+          <a:xfrm>
+            <a:off x="923925" y="4386262"/>
+            <a:ext cx="5086350" cy="4154487"/>
+          </a:xfrm>
+          <a:prstGeom prst="rect">
+            <a:avLst/>
+          </a:prstGeom>
+        </p:spPr>
+        <p:txBody>
+          <a:bodyPr wrap="square" lIns="91425" tIns="91425" rIns="91425" bIns="91425" anchor="t" anchorCtr="0">
+            <a:noAutofit/>
+          </a:bodyPr>
+          <a:lstStyle/>
+          <a:p>
+            <a:pPr lvl="0">
+              <a:spcBef>
+                <a:spcPts val="0"/>
+              </a:spcBef>
+              <a:buNone/>
+            </a:pPr>
+            <a:endParaRPr/>
+          </a:p>
+        </p:txBody>
+      </p:sp>
+      <p:sp>
+        <p:nvSpPr>
+          <p:cNvPr id="563" name="Shape 563"/>
           <p:cNvSpPr>
             <a:spLocks noGrp="1" noRot="1" noChangeAspect="1"/>
           </p:cNvSpPr>
@@ -2018,85 +2053,6 @@
           </a:custGeom>
         </p:spPr>
       </p:sp>
-      <p:sp>
-        <p:nvSpPr>
-          <p:cNvPr id="571" name="Shape 571"/>
-          <p:cNvSpPr txBox="1">
-            <a:spLocks noGrp="1"/>
-          </p:cNvSpPr>
-          <p:nvPr>
-            <p:ph type="body" idx="1"/>
-          </p:nvPr>
-        </p:nvSpPr>
-        <p:spPr>
-          <a:xfrm>
-            <a:off x="923925" y="4386262"/>
-            <a:ext cx="5086200" cy="4154400"/>
-          </a:xfrm>
-          <a:prstGeom prst="rect">
-            <a:avLst/>
-          </a:prstGeom>
-        </p:spPr>
-        <p:txBody>
-          <a:bodyPr wrap="square" lIns="91425" tIns="91425" rIns="91425" bIns="91425" anchor="t" anchorCtr="0">
-            <a:noAutofit/>
-          </a:bodyPr>
-          <a:lstStyle/>
-          <a:p>
-            <a:pPr lvl="0">
-              <a:spcBef>
-                <a:spcPts val="0"/>
-              </a:spcBef>
-              <a:buNone/>
-            </a:pPr>
-            <a:endParaRPr/>
-          </a:p>
-        </p:txBody>
-      </p:sp>
-      <p:sp>
-        <p:nvSpPr>
-          <p:cNvPr id="572" name="Shape 572"/>
-          <p:cNvSpPr txBox="1">
-            <a:spLocks noGrp="1"/>
-          </p:cNvSpPr>
-          <p:nvPr>
-            <p:ph type="sldNum" idx="12"/>
-          </p:nvPr>
-        </p:nvSpPr>
-        <p:spPr>
-          <a:xfrm>
-            <a:off x="3929062" y="8770937"/>
-            <a:ext cx="3005100" cy="462000"/>
-          </a:xfrm>
-          <a:prstGeom prst="rect">
-            <a:avLst/>
-          </a:prstGeom>
-        </p:spPr>
-        <p:txBody>
-          <a:bodyPr wrap="square" lIns="92375" tIns="46175" rIns="92375" bIns="46175" anchor="b" anchorCtr="0">
-            <a:noAutofit/>
-          </a:bodyPr>
-          <a:lstStyle/>
-          <a:p>
-            <a:pPr lvl="0">
-              <a:spcBef>
-                <a:spcPts val="0"/>
-              </a:spcBef>
-              <a:buClr>
-                <a:srgbClr val="000000"/>
-              </a:buClr>
-              <a:buSzPct val="25000"/>
-              <a:buFont typeface="Arial"/>
-              <a:buNone/>
-            </a:pPr>
-            <a:fld id="{00000000-1234-1234-1234-123412341234}" type="slidenum">
-              <a:rPr lang="en-US"/>
-              <a:t>6</a:t>
-            </a:fld>
-            <a:endParaRPr lang="en-US"/>
-          </a:p>
-        </p:txBody>
-      </p:sp>
     </p:spTree>
   </p:cSld>
   <p:clrMapOvr>
@@ -2110,7 +2066,7 @@
   <p:cSld>
     <p:spTree>
       <p:nvGrpSpPr>
-        <p:cNvPr id="1" name="Shape 577"/>
+        <p:cNvPr id="1" name="Shape 594"/>
         <p:cNvGrpSpPr/>
         <p:nvPr/>
       </p:nvGrpSpPr>
@@ -2124,7 +2080,7 @@
       </p:grpSpPr>
       <p:sp>
         <p:nvSpPr>
-          <p:cNvPr id="578" name="Shape 578"/>
+          <p:cNvPr id="595" name="Shape 595"/>
           <p:cNvSpPr txBox="1">
             <a:spLocks noGrp="1"/>
           </p:cNvSpPr>
@@ -2159,7 +2115,7 @@
       </p:sp>
       <p:sp>
         <p:nvSpPr>
-          <p:cNvPr id="579" name="Shape 579"/>
+          <p:cNvPr id="596" name="Shape 596"/>
           <p:cNvSpPr>
             <a:spLocks noGrp="1" noRot="1" noChangeAspect="1"/>
           </p:cNvSpPr>
@@ -2211,7 +2167,7 @@
   <p:cSld>
     <p:spTree>
       <p:nvGrpSpPr>
-        <p:cNvPr id="1" name="Shape 585"/>
+        <p:cNvPr id="1" name="Shape 569"/>
         <p:cNvGrpSpPr/>
         <p:nvPr/>
       </p:nvGrpSpPr>
@@ -2225,7 +2181,7 @@
       </p:grpSpPr>
       <p:sp>
         <p:nvSpPr>
-          <p:cNvPr id="586" name="Shape 586"/>
+          <p:cNvPr id="570" name="Shape 570"/>
           <p:cNvSpPr>
             <a:spLocks noGrp="1" noRot="1" noChangeAspect="1"/>
           </p:cNvSpPr>
@@ -2266,7 +2222,7 @@
       </p:sp>
       <p:sp>
         <p:nvSpPr>
-          <p:cNvPr id="587" name="Shape 587"/>
+          <p:cNvPr id="571" name="Shape 571"/>
           <p:cNvSpPr txBox="1">
             <a:spLocks noGrp="1"/>
           </p:cNvSpPr>
@@ -2301,7 +2257,7 @@
       </p:sp>
       <p:sp>
         <p:nvSpPr>
-          <p:cNvPr id="588" name="Shape 588"/>
+          <p:cNvPr id="572" name="Shape 572"/>
           <p:cNvSpPr txBox="1">
             <a:spLocks noGrp="1"/>
           </p:cNvSpPr>
@@ -2356,7 +2312,7 @@
   <p:cSld>
     <p:spTree>
       <p:nvGrpSpPr>
-        <p:cNvPr id="1" name="Shape 594"/>
+        <p:cNvPr id="1" name="Shape 585"/>
         <p:cNvGrpSpPr/>
         <p:nvPr/>
       </p:nvGrpSpPr>
@@ -2370,42 +2326,7 @@
       </p:grpSpPr>
       <p:sp>
         <p:nvSpPr>
-          <p:cNvPr id="595" name="Shape 595"/>
-          <p:cNvSpPr txBox="1">
-            <a:spLocks noGrp="1"/>
-          </p:cNvSpPr>
-          <p:nvPr>
-            <p:ph type="body" idx="1"/>
-          </p:nvPr>
-        </p:nvSpPr>
-        <p:spPr>
-          <a:xfrm>
-            <a:off x="923925" y="4386262"/>
-            <a:ext cx="5086350" cy="4154487"/>
-          </a:xfrm>
-          <a:prstGeom prst="rect">
-            <a:avLst/>
-          </a:prstGeom>
-        </p:spPr>
-        <p:txBody>
-          <a:bodyPr wrap="square" lIns="91425" tIns="91425" rIns="91425" bIns="91425" anchor="t" anchorCtr="0">
-            <a:noAutofit/>
-          </a:bodyPr>
-          <a:lstStyle/>
-          <a:p>
-            <a:pPr lvl="0">
-              <a:spcBef>
-                <a:spcPts val="0"/>
-              </a:spcBef>
-              <a:buNone/>
-            </a:pPr>
-            <a:endParaRPr/>
-          </a:p>
-        </p:txBody>
-      </p:sp>
-      <p:sp>
-        <p:nvSpPr>
-          <p:cNvPr id="596" name="Shape 596"/>
+          <p:cNvPr id="586" name="Shape 586"/>
           <p:cNvSpPr>
             <a:spLocks noGrp="1" noRot="1" noChangeAspect="1"/>
           </p:cNvSpPr>
@@ -2443,6 +2364,85 @@
             </a:pathLst>
           </a:custGeom>
         </p:spPr>
+      </p:sp>
+      <p:sp>
+        <p:nvSpPr>
+          <p:cNvPr id="587" name="Shape 587"/>
+          <p:cNvSpPr txBox="1">
+            <a:spLocks noGrp="1"/>
+          </p:cNvSpPr>
+          <p:nvPr>
+            <p:ph type="body" idx="1"/>
+          </p:nvPr>
+        </p:nvSpPr>
+        <p:spPr>
+          <a:xfrm>
+            <a:off x="923925" y="4386262"/>
+            <a:ext cx="5086200" cy="4154400"/>
+          </a:xfrm>
+          <a:prstGeom prst="rect">
+            <a:avLst/>
+          </a:prstGeom>
+        </p:spPr>
+        <p:txBody>
+          <a:bodyPr wrap="square" lIns="91425" tIns="91425" rIns="91425" bIns="91425" anchor="t" anchorCtr="0">
+            <a:noAutofit/>
+          </a:bodyPr>
+          <a:lstStyle/>
+          <a:p>
+            <a:pPr lvl="0">
+              <a:spcBef>
+                <a:spcPts val="0"/>
+              </a:spcBef>
+              <a:buNone/>
+            </a:pPr>
+            <a:endParaRPr/>
+          </a:p>
+        </p:txBody>
+      </p:sp>
+      <p:sp>
+        <p:nvSpPr>
+          <p:cNvPr id="588" name="Shape 588"/>
+          <p:cNvSpPr txBox="1">
+            <a:spLocks noGrp="1"/>
+          </p:cNvSpPr>
+          <p:nvPr>
+            <p:ph type="sldNum" idx="12"/>
+          </p:nvPr>
+        </p:nvSpPr>
+        <p:spPr>
+          <a:xfrm>
+            <a:off x="3929062" y="8770937"/>
+            <a:ext cx="3005100" cy="462000"/>
+          </a:xfrm>
+          <a:prstGeom prst="rect">
+            <a:avLst/>
+          </a:prstGeom>
+        </p:spPr>
+        <p:txBody>
+          <a:bodyPr wrap="square" lIns="92375" tIns="46175" rIns="92375" bIns="46175" anchor="b" anchorCtr="0">
+            <a:noAutofit/>
+          </a:bodyPr>
+          <a:lstStyle/>
+          <a:p>
+            <a:pPr lvl="0">
+              <a:spcBef>
+                <a:spcPts val="0"/>
+              </a:spcBef>
+              <a:buClr>
+                <a:srgbClr val="000000"/>
+              </a:buClr>
+              <a:buSzPct val="25000"/>
+              <a:buFont typeface="Arial"/>
+              <a:buNone/>
+            </a:pPr>
+            <a:fld id="{00000000-1234-1234-1234-123412341234}" type="slidenum">
+              <a:rPr lang="en-US"/>
+              <a:t>9</a:t>
+            </a:fld>
+            <a:endParaRPr lang="en-US"/>
+          </a:p>
+        </p:txBody>
       </p:sp>
     </p:spTree>
   </p:cSld>
@@ -2913,7 +2913,7 @@
           <a:p>
             <a:fld id="{559FE8C8-AC97-4ADA-A254-8F11A723A69F}" type="datetimeFigureOut">
               <a:rPr lang="en-US" smtClean="0"/>
-              <a:t>5/27/2019</a:t>
+              <a:t>6/25/2019</a:t>
             </a:fld>
             <a:endParaRPr lang="en-US"/>
           </a:p>
@@ -3334,7 +3334,7 @@
           <a:p>
             <a:fld id="{B88F23AA-34D9-4A18-A5A1-06793324E42C}" type="datetimeFigureOut">
               <a:rPr lang="en-US" smtClean="0"/>
-              <a:t>5/27/2019</a:t>
+              <a:t>6/25/2019</a:t>
             </a:fld>
             <a:endParaRPr lang="en-US"/>
           </a:p>
@@ -3456,7 +3456,7 @@
           <a:p>
             <a:fld id="{8DA20C1D-75ED-450C-88C7-C497EA874E9C}" type="datetimeFigureOut">
               <a:rPr lang="en-US" smtClean="0"/>
-              <a:t>5/27/2019</a:t>
+              <a:t>6/25/2019</a:t>
             </a:fld>
             <a:endParaRPr lang="en-US"/>
           </a:p>
@@ -4650,7 +4650,7 @@
           <a:p>
             <a:fld id="{FEFA0557-7C35-4D1D-B97A-95898D157B33}" type="datetimeFigureOut">
               <a:rPr lang="en-US" smtClean="0"/>
-              <a:t>5/27/2019</a:t>
+              <a:t>6/25/2019</a:t>
             </a:fld>
             <a:endParaRPr lang="en-US"/>
           </a:p>
@@ -4936,7 +4936,7 @@
           <a:p>
             <a:fld id="{B236AB90-F632-4852-BC4B-53E103869F3D}" type="datetimeFigureOut">
               <a:rPr lang="en-US" smtClean="0"/>
-              <a:t>5/27/2019</a:t>
+              <a:t>6/25/2019</a:t>
             </a:fld>
             <a:endParaRPr lang="en-US"/>
           </a:p>
@@ -5322,7 +5322,7 @@
           <a:p>
             <a:fld id="{12374C44-A702-4728-BB40-76FE555B9CF1}" type="datetimeFigureOut">
               <a:rPr lang="en-US" smtClean="0"/>
-              <a:t>5/27/2019</a:t>
+              <a:t>6/25/2019</a:t>
             </a:fld>
             <a:endParaRPr lang="en-US"/>
           </a:p>
@@ -5535,7 +5535,7 @@
           <a:p>
             <a:fld id="{E1F32DF0-702E-431A-ADCF-2A06AC4E7F57}" type="datetimeFigureOut">
               <a:rPr lang="en-US" smtClean="0"/>
-              <a:t>5/27/2019</a:t>
+              <a:t>6/25/2019</a:t>
             </a:fld>
             <a:endParaRPr lang="en-US"/>
           </a:p>
@@ -5839,7 +5839,7 @@
           <a:p>
             <a:fld id="{DBDC1F8B-7509-4E85-ABDB-3F1EEA772746}" type="datetimeFigureOut">
               <a:rPr lang="en-US" smtClean="0"/>
-              <a:t>5/27/2019</a:t>
+              <a:t>6/25/2019</a:t>
             </a:fld>
             <a:endParaRPr lang="en-US"/>
           </a:p>
@@ -6131,7 +6131,7 @@
           <a:p>
             <a:fld id="{52C5D9E0-CA9E-46E5-9606-B0D66E683FEE}" type="datetimeFigureOut">
               <a:rPr lang="en-US" smtClean="0"/>
-              <a:t>5/27/2019</a:t>
+              <a:t>6/25/2019</a:t>
             </a:fld>
             <a:endParaRPr lang="en-US"/>
           </a:p>
@@ -6705,7 +6705,7 @@
           <a:p>
             <a:fld id="{5BA37E64-D101-4693-B362-74BB0158B47B}" type="datetimeFigureOut">
               <a:rPr lang="en-US" smtClean="0"/>
-              <a:t>5/27/2019</a:t>
+              <a:t>6/25/2019</a:t>
             </a:fld>
             <a:endParaRPr lang="en-US"/>
           </a:p>
@@ -6881,7 +6881,7 @@
           <a:p>
             <a:fld id="{FACA2033-B529-4F88-BF0F-C9E77C7AF715}" type="datetimeFigureOut">
               <a:rPr lang="en-US" smtClean="0"/>
-              <a:t>5/27/2019</a:t>
+              <a:t>6/25/2019</a:t>
             </a:fld>
             <a:endParaRPr lang="en-US"/>
           </a:p>
@@ -7521,7 +7521,7 @@
           <a:p>
             <a:fld id="{2F850279-8577-4DB5-A1B1-2A1239DFFE30}" type="datetimeFigureOut">
               <a:rPr lang="en-US" smtClean="0"/>
-              <a:t>5/27/2019</a:t>
+              <a:t>6/25/2019</a:t>
             </a:fld>
             <a:endParaRPr lang="en-US"/>
           </a:p>
@@ -9382,7 +9382,7 @@
   <p:cSld>
     <p:spTree>
       <p:nvGrpSpPr>
-        <p:cNvPr id="1" name="Shape 556"/>
+        <p:cNvPr id="1" name="Shape 580"/>
         <p:cNvGrpSpPr/>
         <p:nvPr/>
       </p:nvGrpSpPr>
@@ -9396,7 +9396,7 @@
       </p:grpSpPr>
       <p:sp>
         <p:nvSpPr>
-          <p:cNvPr id="557" name="Shape 557"/>
+          <p:cNvPr id="581" name="Shape 581"/>
           <p:cNvSpPr txBox="1">
             <a:spLocks noGrp="1"/>
           </p:cNvSpPr>
@@ -9406,8 +9406,8 @@
         </p:nvSpPr>
         <p:spPr>
           <a:xfrm>
-            <a:off x="592137" y="533400"/>
-            <a:ext cx="8229600" cy="758825"/>
+            <a:off x="0" y="0"/>
+            <a:ext cx="9296400" cy="960300"/>
           </a:xfrm>
           <a:prstGeom prst="rect">
             <a:avLst/>
@@ -9441,7 +9441,7 @@
               <a:buNone/>
             </a:pPr>
             <a:r>
-              <a:rPr lang="en-US" sz="3400" b="0" i="0" u="none" strike="noStrike" cap="none">
+              <a:rPr lang="en-US" sz="3400" b="0" i="0" u="none" strike="noStrike" cap="none" dirty="0">
                 <a:solidFill>
                   <a:schemeClr val="dk2"/>
                 </a:solidFill>
@@ -9450,10 +9450,10 @@
                 <a:cs typeface="Arial"/>
                 <a:sym typeface="Arial"/>
               </a:rPr>
-              <a:t>Best practices – commit</a:t>
+              <a:t>Best practices – local feature </a:t>
             </a:r>
-            <a:br>
-              <a:rPr lang="en-US" sz="3400" b="0" i="0" u="none" strike="noStrike" cap="none">
+            <a:r>
+              <a:rPr lang="en-US" sz="3400" b="0" i="0" u="none" strike="noStrike" cap="none" dirty="0" smtClean="0">
                 <a:solidFill>
                   <a:schemeClr val="dk2"/>
                 </a:solidFill>
@@ -9462,9 +9462,10 @@
                 <a:cs typeface="Arial"/>
                 <a:sym typeface="Arial"/>
               </a:rPr>
-            </a:br>
+              <a:t>branches (topics)</a:t>
+            </a:r>
             <a:r>
-              <a:rPr lang="en-US" sz="3400" b="0" i="0" u="none" strike="noStrike" cap="none">
+              <a:rPr lang="en-US" sz="3400" b="0" i="0" u="none" strike="noStrike" cap="none" dirty="0">
                 <a:solidFill>
                   <a:schemeClr val="dk2"/>
                 </a:solidFill>
@@ -9476,7 +9477,7 @@
               <a:t/>
             </a:r>
             <a:br>
-              <a:rPr lang="en-US" sz="3400" b="0" i="0" u="none" strike="noStrike" cap="none">
+              <a:rPr lang="en-US" sz="3400" b="0" i="0" u="none" strike="noStrike" cap="none" dirty="0">
                 <a:solidFill>
                   <a:schemeClr val="dk2"/>
                 </a:solidFill>
@@ -9486,7 +9487,30 @@
                 <a:sym typeface="Arial"/>
               </a:rPr>
             </a:br>
-            <a:endParaRPr lang="en-US" sz="3400" b="0" i="0" u="none" strike="noStrike" cap="none">
+            <a:r>
+              <a:rPr lang="en-US" sz="3400" b="0" i="0" u="none" strike="noStrike" cap="none" dirty="0">
+                <a:solidFill>
+                  <a:schemeClr val="dk2"/>
+                </a:solidFill>
+                <a:latin typeface="Arial"/>
+                <a:ea typeface="Arial"/>
+                <a:cs typeface="Arial"/>
+                <a:sym typeface="Arial"/>
+              </a:rPr>
+              <a:t/>
+            </a:r>
+            <a:br>
+              <a:rPr lang="en-US" sz="3400" b="0" i="0" u="none" strike="noStrike" cap="none" dirty="0">
+                <a:solidFill>
+                  <a:schemeClr val="dk2"/>
+                </a:solidFill>
+                <a:latin typeface="Arial"/>
+                <a:ea typeface="Arial"/>
+                <a:cs typeface="Arial"/>
+                <a:sym typeface="Arial"/>
+              </a:rPr>
+            </a:br>
+            <a:endParaRPr lang="en-US" sz="3400" b="0" i="0" u="none" strike="noStrike" cap="none" dirty="0">
               <a:solidFill>
                 <a:schemeClr val="dk2"/>
               </a:solidFill>
@@ -9500,7 +9524,7 @@
       </p:sp>
       <p:sp>
         <p:nvSpPr>
-          <p:cNvPr id="558" name="Shape 558"/>
+          <p:cNvPr id="582" name="Shape 582"/>
           <p:cNvSpPr txBox="1"/>
           <p:nvPr/>
         </p:nvSpPr>
@@ -9557,7 +9581,7 @@
       </p:sp>
       <p:sp>
         <p:nvSpPr>
-          <p:cNvPr id="559" name="Shape 559"/>
+          <p:cNvPr id="583" name="Shape 583"/>
           <p:cNvSpPr txBox="1"/>
           <p:nvPr/>
         </p:nvSpPr>
@@ -9623,7 +9647,7 @@
       </p:sp>
       <p:pic>
         <p:nvPicPr>
-          <p:cNvPr id="560" name="Shape 560"/>
+          <p:cNvPr id="584" name="Shape 584"/>
           <p:cNvPicPr preferRelativeResize="0">
             <a:picLocks noGrp="1"/>
           </p:cNvPicPr>
@@ -9640,8 +9664,8 @@
         </p:blipFill>
         <p:spPr>
           <a:xfrm>
-            <a:off x="152400" y="1273175"/>
-            <a:ext cx="8796337" cy="4899025"/>
+            <a:off x="157163" y="914400"/>
+            <a:ext cx="8758237" cy="4678362"/>
           </a:xfrm>
           <a:prstGeom prst="rect">
             <a:avLst/>
@@ -9687,6 +9711,36 @@
           <a:lstStyle/>
           <a:p>
             <a:endParaRPr lang="en-US"/>
+          </a:p>
+        </p:txBody>
+      </p:sp>
+      <p:sp>
+        <p:nvSpPr>
+          <p:cNvPr id="4" name="TextBox 3"/>
+          <p:cNvSpPr txBox="1"/>
+          <p:nvPr/>
+        </p:nvSpPr>
+        <p:spPr>
+          <a:xfrm>
+            <a:off x="457200" y="6172200"/>
+            <a:ext cx="4003019" cy="307777"/>
+          </a:xfrm>
+          <a:prstGeom prst="rect">
+            <a:avLst/>
+          </a:prstGeom>
+          <a:noFill/>
+        </p:spPr>
+        <p:txBody>
+          <a:bodyPr wrap="none" rtlCol="0">
+            <a:spAutoFit/>
+          </a:bodyPr>
+          <a:lstStyle/>
+          <a:p>
+            <a:r>
+              <a:rPr lang="en-US" dirty="0" smtClean="0"/>
+              <a:t>Demo: create feature branch, checkout, commit </a:t>
+            </a:r>
+            <a:endParaRPr lang="en-US" dirty="0"/>
           </a:p>
         </p:txBody>
       </p:sp>
@@ -9710,7 +9764,7 @@
   <p:cSld>
     <p:spTree>
       <p:nvGrpSpPr>
-        <p:cNvPr id="1" name="Shape 564"/>
+        <p:cNvPr id="1" name="Shape 556"/>
         <p:cNvGrpSpPr/>
         <p:nvPr/>
       </p:nvGrpSpPr>
@@ -9724,7 +9778,7 @@
       </p:grpSpPr>
       <p:sp>
         <p:nvSpPr>
-          <p:cNvPr id="565" name="Shape 565"/>
+          <p:cNvPr id="557" name="Shape 557"/>
           <p:cNvSpPr txBox="1">
             <a:spLocks noGrp="1"/>
           </p:cNvSpPr>
@@ -9778,7 +9832,7 @@
                 <a:cs typeface="Arial"/>
                 <a:sym typeface="Arial"/>
               </a:rPr>
-              <a:t>Best practices – squashing</a:t>
+              <a:t>Best practices – commit</a:t>
             </a:r>
             <a:br>
               <a:rPr lang="en-US" sz="3400" b="0" i="0" u="none" strike="noStrike" cap="none">
@@ -9828,7 +9882,7 @@
       </p:sp>
       <p:sp>
         <p:nvSpPr>
-          <p:cNvPr id="566" name="Shape 566"/>
+          <p:cNvPr id="558" name="Shape 558"/>
           <p:cNvSpPr txBox="1"/>
           <p:nvPr/>
         </p:nvSpPr>
@@ -9885,7 +9939,7 @@
       </p:sp>
       <p:sp>
         <p:nvSpPr>
-          <p:cNvPr id="567" name="Shape 567"/>
+          <p:cNvPr id="559" name="Shape 559"/>
           <p:cNvSpPr txBox="1"/>
           <p:nvPr/>
         </p:nvSpPr>
@@ -9951,7 +10005,7 @@
       </p:sp>
       <p:pic>
         <p:nvPicPr>
-          <p:cNvPr id="568" name="Shape 568"/>
+          <p:cNvPr id="560" name="Shape 560"/>
           <p:cNvPicPr preferRelativeResize="0">
             <a:picLocks noGrp="1"/>
           </p:cNvPicPr>
@@ -9968,8 +10022,8 @@
         </p:blipFill>
         <p:spPr>
           <a:xfrm>
-            <a:off x="0" y="1549400"/>
-            <a:ext cx="9150350" cy="4394200"/>
+            <a:off x="152400" y="1273175"/>
+            <a:ext cx="8796337" cy="4670425"/>
           </a:xfrm>
           <a:prstGeom prst="rect">
             <a:avLst/>
@@ -9982,14 +10036,52 @@
       </p:pic>
       <p:sp>
         <p:nvSpPr>
-          <p:cNvPr id="2" name="TextBox 1"/>
+          <p:cNvPr id="2" name="Footer Placeholder 1" hidden="1"/>
+          <p:cNvSpPr>
+            <a:spLocks noGrp="1"/>
+          </p:cNvSpPr>
+          <p:nvPr>
+            <p:ph type="ftr" idx="11"/>
+          </p:nvPr>
+        </p:nvSpPr>
+        <p:spPr/>
+        <p:txBody>
+          <a:bodyPr/>
+          <a:lstStyle/>
+          <a:p>
+            <a:endParaRPr lang="en-US"/>
+          </a:p>
+        </p:txBody>
+      </p:sp>
+      <p:sp>
+        <p:nvSpPr>
+          <p:cNvPr id="3" name="Date Placeholder 2" hidden="1"/>
+          <p:cNvSpPr>
+            <a:spLocks noGrp="1"/>
+          </p:cNvSpPr>
+          <p:nvPr>
+            <p:ph type="dt" idx="10"/>
+          </p:nvPr>
+        </p:nvSpPr>
+        <p:spPr/>
+        <p:txBody>
+          <a:bodyPr/>
+          <a:lstStyle/>
+          <a:p>
+            <a:endParaRPr lang="en-US"/>
+          </a:p>
+        </p:txBody>
+      </p:sp>
+      <p:sp>
+        <p:nvSpPr>
+          <p:cNvPr id="4" name="TextBox 3"/>
           <p:cNvSpPr txBox="1"/>
           <p:nvPr/>
         </p:nvSpPr>
         <p:spPr>
           <a:xfrm>
-            <a:off x="609600" y="6096000"/>
-            <a:ext cx="1903085" cy="400110"/>
+            <a:off x="296839" y="6260426"/>
+            <a:ext cx="8839200" cy="461665"/>
           </a:xfrm>
           <a:prstGeom prst="rect">
             <a:avLst/>
@@ -9997,62 +10089,16 @@
           <a:noFill/>
         </p:spPr>
         <p:txBody>
-          <a:bodyPr wrap="none" rtlCol="0">
+          <a:bodyPr wrap="square" rtlCol="0">
             <a:spAutoFit/>
           </a:bodyPr>
           <a:lstStyle/>
           <a:p>
             <a:r>
-              <a:rPr lang="en-US" sz="2000" dirty="0" smtClean="0"/>
-              <a:t>Demo</a:t>
+              <a:rPr lang="en-US" sz="2400" dirty="0" smtClean="0"/>
+              <a:t>Demo: vim, change, commit, auto-commit, git log –c, git reset </a:t>
             </a:r>
-            <a:r>
-              <a:rPr lang="en-US" dirty="0" smtClean="0"/>
-              <a:t>: git rebase -</a:t>
-            </a:r>
-            <a:r>
-              <a:rPr lang="en-US" dirty="0" err="1" smtClean="0"/>
-              <a:t>i</a:t>
-            </a:r>
-            <a:endParaRPr lang="en-US" dirty="0"/>
-          </a:p>
-        </p:txBody>
-      </p:sp>
-      <p:sp>
-        <p:nvSpPr>
-          <p:cNvPr id="3" name="Footer Placeholder 2" hidden="1"/>
-          <p:cNvSpPr>
-            <a:spLocks noGrp="1"/>
-          </p:cNvSpPr>
-          <p:nvPr>
-            <p:ph type="ftr" idx="11"/>
-          </p:nvPr>
-        </p:nvSpPr>
-        <p:spPr/>
-        <p:txBody>
-          <a:bodyPr/>
-          <a:lstStyle/>
-          <a:p>
-            <a:endParaRPr lang="en-US"/>
-          </a:p>
-        </p:txBody>
-      </p:sp>
-      <p:sp>
-        <p:nvSpPr>
-          <p:cNvPr id="4" name="Date Placeholder 3" hidden="1"/>
-          <p:cNvSpPr>
-            <a:spLocks noGrp="1"/>
-          </p:cNvSpPr>
-          <p:nvPr>
-            <p:ph type="dt" idx="10"/>
-          </p:nvPr>
-        </p:nvSpPr>
-        <p:spPr/>
-        <p:txBody>
-          <a:bodyPr/>
-          <a:lstStyle/>
-          <a:p>
-            <a:endParaRPr lang="en-US"/>
+            <a:endParaRPr lang="en-US" sz="2400" dirty="0"/>
           </a:p>
         </p:txBody>
       </p:sp>
@@ -10076,7 +10122,7 @@
   <p:cSld>
     <p:spTree>
       <p:nvGrpSpPr>
-        <p:cNvPr id="1" name="Shape 573"/>
+        <p:cNvPr id="1" name="Shape 564"/>
         <p:cNvGrpSpPr/>
         <p:nvPr/>
       </p:nvGrpSpPr>
@@ -10090,7 +10136,7 @@
       </p:grpSpPr>
       <p:sp>
         <p:nvSpPr>
-          <p:cNvPr id="574" name="Shape 574"/>
+          <p:cNvPr id="565" name="Shape 565"/>
           <p:cNvSpPr txBox="1">
             <a:spLocks noGrp="1"/>
           </p:cNvSpPr>
@@ -10100,50 +10146,16 @@
         </p:nvSpPr>
         <p:spPr>
           <a:xfrm>
-            <a:off x="0" y="149800"/>
-            <a:ext cx="9144000" cy="758700"/>
-          </a:xfrm>
-          <a:prstGeom prst="rect">
-            <a:avLst/>
-          </a:prstGeom>
-        </p:spPr>
-        <p:txBody>
-          <a:bodyPr wrap="square" lIns="91425" tIns="91425" rIns="91425" bIns="91425" anchor="t" anchorCtr="0">
-            <a:noAutofit/>
-          </a:bodyPr>
-          <a:lstStyle/>
-          <a:p>
-            <a:pPr lvl="0">
-              <a:spcBef>
-                <a:spcPts val="0"/>
-              </a:spcBef>
-              <a:buNone/>
-            </a:pPr>
-            <a:r>
-              <a:rPr lang="en-US"/>
-              <a:t>Best practices - concise commit messages</a:t>
-            </a:r>
-          </a:p>
-        </p:txBody>
-      </p:sp>
-      <p:sp>
-        <p:nvSpPr>
-          <p:cNvPr id="575" name="Shape 575"/>
-          <p:cNvSpPr txBox="1">
-            <a:spLocks noGrp="1"/>
-          </p:cNvSpPr>
-          <p:nvPr>
-            <p:ph type="sldNum" idx="12"/>
-          </p:nvPr>
-        </p:nvSpPr>
-        <p:spPr>
-          <a:xfrm>
-            <a:off x="8077200" y="6553200"/>
-            <a:ext cx="838200" cy="228600"/>
-          </a:xfrm>
-          <a:prstGeom prst="rect">
-            <a:avLst/>
-          </a:prstGeom>
+            <a:off x="592137" y="533400"/>
+            <a:ext cx="8229600" cy="758825"/>
+          </a:xfrm>
+          <a:prstGeom prst="rect">
+            <a:avLst/>
+          </a:prstGeom>
+          <a:noFill/>
+          <a:ln>
+            <a:noFill/>
+          </a:ln>
         </p:spPr>
         <p:txBody>
           <a:bodyPr wrap="square" lIns="91425" tIns="45700" rIns="91425" bIns="45700" anchor="t" anchorCtr="0">
@@ -10151,10 +10163,116 @@
           </a:bodyPr>
           <a:lstStyle/>
           <a:p>
-            <a:pPr lvl="0">
-              <a:spcBef>
-                <a:spcPts val="0"/>
-              </a:spcBef>
+            <a:pPr marL="0" marR="0" lvl="0" indent="0" algn="l" rtl="0">
+              <a:lnSpc>
+                <a:spcPct val="100000"/>
+              </a:lnSpc>
+              <a:spcBef>
+                <a:spcPts val="0"/>
+              </a:spcBef>
+              <a:spcAft>
+                <a:spcPts val="0"/>
+              </a:spcAft>
+              <a:buClr>
+                <a:schemeClr val="dk2"/>
+              </a:buClr>
+              <a:buSzPct val="25000"/>
+              <a:buFont typeface="Arial"/>
+              <a:buNone/>
+            </a:pPr>
+            <a:r>
+              <a:rPr lang="en-US" sz="3400" b="0" i="0" u="none" strike="noStrike" cap="none">
+                <a:solidFill>
+                  <a:schemeClr val="dk2"/>
+                </a:solidFill>
+                <a:latin typeface="Arial"/>
+                <a:ea typeface="Arial"/>
+                <a:cs typeface="Arial"/>
+                <a:sym typeface="Arial"/>
+              </a:rPr>
+              <a:t>Best practices – squashing</a:t>
+            </a:r>
+            <a:br>
+              <a:rPr lang="en-US" sz="3400" b="0" i="0" u="none" strike="noStrike" cap="none">
+                <a:solidFill>
+                  <a:schemeClr val="dk2"/>
+                </a:solidFill>
+                <a:latin typeface="Arial"/>
+                <a:ea typeface="Arial"/>
+                <a:cs typeface="Arial"/>
+                <a:sym typeface="Arial"/>
+              </a:rPr>
+            </a:br>
+            <a:r>
+              <a:rPr lang="en-US" sz="3400" b="0" i="0" u="none" strike="noStrike" cap="none">
+                <a:solidFill>
+                  <a:schemeClr val="dk2"/>
+                </a:solidFill>
+                <a:latin typeface="Arial"/>
+                <a:ea typeface="Arial"/>
+                <a:cs typeface="Arial"/>
+                <a:sym typeface="Arial"/>
+              </a:rPr>
+              <a:t/>
+            </a:r>
+            <a:br>
+              <a:rPr lang="en-US" sz="3400" b="0" i="0" u="none" strike="noStrike" cap="none">
+                <a:solidFill>
+                  <a:schemeClr val="dk2"/>
+                </a:solidFill>
+                <a:latin typeface="Arial"/>
+                <a:ea typeface="Arial"/>
+                <a:cs typeface="Arial"/>
+                <a:sym typeface="Arial"/>
+              </a:rPr>
+            </a:br>
+            <a:endParaRPr lang="en-US" sz="3400" b="0" i="0" u="none" strike="noStrike" cap="none">
+              <a:solidFill>
+                <a:schemeClr val="dk2"/>
+              </a:solidFill>
+              <a:latin typeface="Arial"/>
+              <a:ea typeface="Arial"/>
+              <a:cs typeface="Arial"/>
+              <a:sym typeface="Arial"/>
+            </a:endParaRPr>
+          </a:p>
+        </p:txBody>
+      </p:sp>
+      <p:sp>
+        <p:nvSpPr>
+          <p:cNvPr id="566" name="Shape 566"/>
+          <p:cNvSpPr txBox="1"/>
+          <p:nvPr/>
+        </p:nvSpPr>
+        <p:spPr>
+          <a:xfrm>
+            <a:off x="6477000" y="6553200"/>
+            <a:ext cx="1524000" cy="228600"/>
+          </a:xfrm>
+          <a:prstGeom prst="rect">
+            <a:avLst/>
+          </a:prstGeom>
+          <a:noFill/>
+          <a:ln>
+            <a:noFill/>
+          </a:ln>
+        </p:spPr>
+        <p:txBody>
+          <a:bodyPr wrap="square" lIns="91425" tIns="45700" rIns="91425" bIns="45700" anchor="t" anchorCtr="0">
+            <a:noAutofit/>
+          </a:bodyPr>
+          <a:lstStyle/>
+          <a:p>
+            <a:pPr marL="0" marR="0" lvl="0" indent="0" algn="l" rtl="0">
+              <a:lnSpc>
+                <a:spcPct val="100000"/>
+              </a:lnSpc>
+              <a:spcBef>
+                <a:spcPts val="0"/>
+              </a:spcBef>
+              <a:spcAft>
+                <a:spcPts val="0"/>
+              </a:spcAft>
               <a:buClr>
                 <a:schemeClr val="lt2"/>
               </a:buClr>
@@ -10162,31 +10280,108 @@
               <a:buFont typeface="Arial"/>
               <a:buNone/>
             </a:pPr>
+            <a:r>
+              <a:rPr lang="en-US" sz="700" b="0" i="0" u="none">
+                <a:solidFill>
+                  <a:schemeClr val="lt2"/>
+                </a:solidFill>
+                <a:latin typeface="Arial"/>
+                <a:ea typeface="Arial"/>
+                <a:cs typeface="Arial"/>
+                <a:sym typeface="Arial"/>
+              </a:rPr>
+              <a:t>*</a:t>
+            </a:r>
+          </a:p>
+        </p:txBody>
+      </p:sp>
+      <p:sp>
+        <p:nvSpPr>
+          <p:cNvPr id="567" name="Shape 567"/>
+          <p:cNvSpPr txBox="1"/>
+          <p:nvPr/>
+        </p:nvSpPr>
+        <p:spPr>
+          <a:xfrm>
+            <a:off x="8077200" y="6553200"/>
+            <a:ext cx="838200" cy="228600"/>
+          </a:xfrm>
+          <a:prstGeom prst="rect">
+            <a:avLst/>
+          </a:prstGeom>
+          <a:noFill/>
+          <a:ln>
+            <a:noFill/>
+          </a:ln>
+        </p:spPr>
+        <p:txBody>
+          <a:bodyPr wrap="square" lIns="91425" tIns="45700" rIns="91425" bIns="45700" anchor="t" anchorCtr="0">
+            <a:noAutofit/>
+          </a:bodyPr>
+          <a:lstStyle/>
+          <a:p>
+            <a:pPr marL="0" marR="0" lvl="0" indent="0" algn="r" rtl="0">
+              <a:lnSpc>
+                <a:spcPct val="100000"/>
+              </a:lnSpc>
+              <a:spcBef>
+                <a:spcPts val="0"/>
+              </a:spcBef>
+              <a:spcAft>
+                <a:spcPts val="0"/>
+              </a:spcAft>
+              <a:buClr>
+                <a:schemeClr val="lt2"/>
+              </a:buClr>
+              <a:buSzPct val="25000"/>
+              <a:buFont typeface="Arial"/>
+              <a:buNone/>
+            </a:pPr>
             <a:fld id="{00000000-1234-1234-1234-123412341234}" type="slidenum">
-              <a:rPr lang="en-US"/>
+              <a:rPr lang="en-US" sz="700" b="0" i="0" u="none">
+                <a:solidFill>
+                  <a:schemeClr val="lt2"/>
+                </a:solidFill>
+                <a:latin typeface="Arial"/>
+                <a:ea typeface="Arial"/>
+                <a:cs typeface="Arial"/>
+                <a:sym typeface="Arial"/>
+              </a:rPr>
               <a:t>6</a:t>
             </a:fld>
-            <a:endParaRPr lang="en-US"/>
+            <a:endParaRPr lang="en-US" sz="700" b="0" i="0" u="none">
+              <a:solidFill>
+                <a:schemeClr val="lt2"/>
+              </a:solidFill>
+              <a:latin typeface="Arial"/>
+              <a:ea typeface="Arial"/>
+              <a:cs typeface="Arial"/>
+              <a:sym typeface="Arial"/>
+            </a:endParaRPr>
           </a:p>
         </p:txBody>
       </p:sp>
       <p:pic>
         <p:nvPicPr>
-          <p:cNvPr id="576" name="Shape 576" descr="commit_message_header.png"/>
-          <p:cNvPicPr preferRelativeResize="0"/>
-          <p:nvPr/>
+          <p:cNvPr id="568" name="Shape 568"/>
+          <p:cNvPicPr preferRelativeResize="0">
+            <a:picLocks noGrp="1"/>
+          </p:cNvPicPr>
+          <p:nvPr>
+            <p:ph type="body" idx="1"/>
+          </p:nvPr>
         </p:nvPicPr>
         <p:blipFill rotWithShape="1">
           <a:blip r:embed="rId3">
             <a:alphaModFix/>
           </a:blip>
-          <a:srcRect t="31307"/>
+          <a:srcRect/>
           <a:stretch/>
         </p:blipFill>
         <p:spPr>
           <a:xfrm>
-            <a:off x="0" y="2954867"/>
-            <a:ext cx="9144000" cy="2721558"/>
+            <a:off x="0" y="1549400"/>
+            <a:ext cx="9150350" cy="4394200"/>
           </a:xfrm>
           <a:prstGeom prst="rect">
             <a:avLst/>
@@ -10205,8 +10400,8 @@
         </p:nvSpPr>
         <p:spPr>
           <a:xfrm>
-            <a:off x="8467" y="1524000"/>
-            <a:ext cx="9067800" cy="1200329"/>
+            <a:off x="609600" y="6096000"/>
+            <a:ext cx="3744936" cy="461665"/>
           </a:xfrm>
           <a:prstGeom prst="rect">
             <a:avLst/>
@@ -10214,20 +10409,18 @@
           <a:noFill/>
         </p:spPr>
         <p:txBody>
-          <a:bodyPr wrap="square" rtlCol="0">
+          <a:bodyPr wrap="none" rtlCol="0">
             <a:spAutoFit/>
           </a:bodyPr>
           <a:lstStyle/>
           <a:p>
             <a:r>
               <a:rPr lang="en-US" sz="2400" dirty="0" smtClean="0"/>
-              <a:t>Limit commit message header to 70 chars and it must be simple, clear, self explained – this is the line all will see!</a:t>
+              <a:t>Demo: git </a:t>
             </a:r>
-          </a:p>
-          <a:p>
             <a:r>
               <a:rPr lang="en-US" sz="2400" dirty="0" smtClean="0"/>
-              <a:t>Meaningful details in the rest of the message</a:t>
+              <a:t>merge --squash</a:t>
             </a:r>
             <a:endParaRPr lang="en-US" sz="2400" dirty="0"/>
           </a:p>
@@ -10235,69 +10428,7 @@
       </p:sp>
       <p:sp>
         <p:nvSpPr>
-          <p:cNvPr id="4" name="TextBox 3"/>
-          <p:cNvSpPr txBox="1"/>
-          <p:nvPr/>
-        </p:nvSpPr>
-        <p:spPr>
-          <a:xfrm>
-            <a:off x="228600" y="6019800"/>
-            <a:ext cx="6553200" cy="307777"/>
-          </a:xfrm>
-          <a:prstGeom prst="rect">
-            <a:avLst/>
-          </a:prstGeom>
-          <a:noFill/>
-        </p:spPr>
-        <p:txBody>
-          <a:bodyPr wrap="square" rtlCol="0">
-            <a:spAutoFit/>
-          </a:bodyPr>
-          <a:lstStyle/>
-          <a:p>
-            <a:r>
-              <a:rPr lang="en-US" dirty="0" smtClean="0">
-                <a:hlinkClick r:id="rId4"/>
-              </a:rPr>
-              <a:t>https://github.com/datreeio/node-datreeio/commits/master</a:t>
-            </a:r>
-            <a:endParaRPr lang="en-US" dirty="0"/>
-          </a:p>
-        </p:txBody>
-      </p:sp>
-      <p:sp>
-        <p:nvSpPr>
-          <p:cNvPr id="3" name="TextBox 2"/>
-          <p:cNvSpPr txBox="1"/>
-          <p:nvPr/>
-        </p:nvSpPr>
-        <p:spPr>
-          <a:xfrm>
-            <a:off x="228600" y="5791200"/>
-            <a:ext cx="2895600" cy="307777"/>
-          </a:xfrm>
-          <a:prstGeom prst="rect">
-            <a:avLst/>
-          </a:prstGeom>
-          <a:noFill/>
-        </p:spPr>
-        <p:txBody>
-          <a:bodyPr wrap="square" rtlCol="0">
-            <a:spAutoFit/>
-          </a:bodyPr>
-          <a:lstStyle/>
-          <a:p>
-            <a:r>
-              <a:rPr lang="en-US" dirty="0" smtClean="0"/>
-              <a:t>Demo: Example:</a:t>
-            </a:r>
-            <a:endParaRPr lang="en-US" dirty="0"/>
-          </a:p>
-        </p:txBody>
-      </p:sp>
-      <p:sp>
-        <p:nvSpPr>
-          <p:cNvPr id="5" name="Footer Placeholder 4" hidden="1"/>
+          <p:cNvPr id="3" name="Footer Placeholder 2" hidden="1"/>
           <p:cNvSpPr>
             <a:spLocks noGrp="1"/>
           </p:cNvSpPr>
@@ -10316,7 +10447,7 @@
       </p:sp>
       <p:sp>
         <p:nvSpPr>
-          <p:cNvPr id="6" name="Date Placeholder 5" hidden="1"/>
+          <p:cNvPr id="4" name="Date Placeholder 3" hidden="1"/>
           <p:cNvSpPr>
             <a:spLocks noGrp="1"/>
           </p:cNvSpPr>
@@ -10353,7 +10484,7 @@
   <p:cSld>
     <p:spTree>
       <p:nvGrpSpPr>
-        <p:cNvPr id="1" name="Shape 580"/>
+        <p:cNvPr id="1" name="Shape 597"/>
         <p:cNvGrpSpPr/>
         <p:nvPr/>
       </p:nvGrpSpPr>
@@ -10367,7 +10498,7 @@
       </p:grpSpPr>
       <p:sp>
         <p:nvSpPr>
-          <p:cNvPr id="581" name="Shape 581"/>
+          <p:cNvPr id="598" name="Shape 598"/>
           <p:cNvSpPr txBox="1">
             <a:spLocks noGrp="1"/>
           </p:cNvSpPr>
@@ -10378,7 +10509,7 @@
         <p:spPr>
           <a:xfrm>
             <a:off x="0" y="0"/>
-            <a:ext cx="9144000" cy="960300"/>
+            <a:ext cx="9144000" cy="682500"/>
           </a:xfrm>
           <a:prstGeom prst="rect">
             <a:avLst/>
@@ -10421,21 +10552,10 @@
                 <a:cs typeface="Arial"/>
                 <a:sym typeface="Arial"/>
               </a:rPr>
-              <a:t>Best practices – local feature branches</a:t>
+              <a:t>Best practices – clean up local branches</a:t>
             </a:r>
-            <a:br>
-              <a:rPr lang="en-US" sz="3400" b="0" i="0" u="none" strike="noStrike" cap="none">
-                <a:solidFill>
-                  <a:schemeClr val="dk2"/>
-                </a:solidFill>
-                <a:latin typeface="Arial"/>
-                <a:ea typeface="Arial"/>
-                <a:cs typeface="Arial"/>
-                <a:sym typeface="Arial"/>
-              </a:rPr>
-            </a:br>
             <a:r>
-              <a:rPr lang="en-US" sz="3400" b="0" i="0" u="none" strike="noStrike" cap="none">
+              <a:rPr lang="en-US" sz="2400" b="0" i="0" u="none" strike="noStrike" cap="none">
                 <a:solidFill>
                   <a:schemeClr val="dk2"/>
                 </a:solidFill>
@@ -10447,7 +10567,7 @@
               <a:t/>
             </a:r>
             <a:br>
-              <a:rPr lang="en-US" sz="3400" b="0" i="0" u="none" strike="noStrike" cap="none">
+              <a:rPr lang="en-US" sz="2400" b="0" i="0" u="none" strike="noStrike" cap="none">
                 <a:solidFill>
                   <a:schemeClr val="dk2"/>
                 </a:solidFill>
@@ -10457,7 +10577,7 @@
                 <a:sym typeface="Arial"/>
               </a:rPr>
             </a:br>
-            <a:endParaRPr lang="en-US" sz="3400" b="0" i="0" u="none" strike="noStrike" cap="none">
+            <a:endParaRPr lang="en-US" sz="2400" b="0" i="0" u="none" strike="noStrike" cap="none">
               <a:solidFill>
                 <a:schemeClr val="dk2"/>
               </a:solidFill>
@@ -10471,7 +10591,7 @@
       </p:sp>
       <p:sp>
         <p:nvSpPr>
-          <p:cNvPr id="582" name="Shape 582"/>
+          <p:cNvPr id="599" name="Shape 599"/>
           <p:cNvSpPr txBox="1"/>
           <p:nvPr/>
         </p:nvSpPr>
@@ -10528,7 +10648,7 @@
       </p:sp>
       <p:sp>
         <p:nvSpPr>
-          <p:cNvPr id="583" name="Shape 583"/>
+          <p:cNvPr id="600" name="Shape 600"/>
           <p:cNvSpPr txBox="1"/>
           <p:nvPr/>
         </p:nvSpPr>
@@ -10594,25 +10714,22 @@
       </p:sp>
       <p:pic>
         <p:nvPicPr>
-          <p:cNvPr id="584" name="Shape 584"/>
-          <p:cNvPicPr preferRelativeResize="0">
-            <a:picLocks noGrp="1"/>
-          </p:cNvPicPr>
-          <p:nvPr>
-            <p:ph type="body" idx="1"/>
-          </p:nvPr>
+          <p:cNvPr id="601" name="Shape 601" descr="Delete_local_feature_branch.png"/>
+          <p:cNvPicPr preferRelativeResize="0"/>
+          <p:nvPr/>
         </p:nvPicPr>
-        <p:blipFill rotWithShape="1">
+        <p:blipFill>
           <a:blip r:embed="rId3">
             <a:alphaModFix/>
           </a:blip>
-          <a:srcRect/>
-          <a:stretch/>
+          <a:stretch>
+            <a:fillRect/>
+          </a:stretch>
         </p:blipFill>
         <p:spPr>
           <a:xfrm>
-            <a:off x="228600" y="1417637"/>
-            <a:ext cx="8758237" cy="4678362"/>
+            <a:off x="0" y="1047850"/>
+            <a:ext cx="9144001" cy="5733950"/>
           </a:xfrm>
           <a:prstGeom prst="rect">
             <a:avLst/>
@@ -10681,7 +10798,7 @@
   <p:cSld>
     <p:spTree>
       <p:nvGrpSpPr>
-        <p:cNvPr id="1" name="Shape 589"/>
+        <p:cNvPr id="1" name="Shape 573"/>
         <p:cNvGrpSpPr/>
         <p:nvPr/>
       </p:nvGrpSpPr>
@@ -10695,7 +10812,7 @@
       </p:grpSpPr>
       <p:sp>
         <p:nvSpPr>
-          <p:cNvPr id="590" name="Shape 590"/>
+          <p:cNvPr id="574" name="Shape 574"/>
           <p:cNvSpPr txBox="1">
             <a:spLocks noGrp="1"/>
           </p:cNvSpPr>
@@ -10705,8 +10822,8 @@
         </p:nvSpPr>
         <p:spPr>
           <a:xfrm>
-            <a:off x="12" y="0"/>
-            <a:ext cx="8229600" cy="758700"/>
+            <a:off x="0" y="149800"/>
+            <a:ext cx="9144000" cy="758700"/>
           </a:xfrm>
           <a:prstGeom prst="rect">
             <a:avLst/>
@@ -10722,121 +10839,32 @@
               <a:spcBef>
                 <a:spcPts val="0"/>
               </a:spcBef>
-              <a:buClr>
-                <a:schemeClr val="dk2"/>
-              </a:buClr>
-              <a:buSzPct val="25000"/>
-              <a:buFont typeface="Arial"/>
               <a:buNone/>
             </a:pPr>
             <a:r>
               <a:rPr lang="en-US"/>
-              <a:t>Best practices – Branch Layout</a:t>
+              <a:t>Best practices - concise commit messages</a:t>
             </a:r>
-            <a:br>
-              <a:rPr lang="en-US"/>
-            </a:br>
-            <a:endParaRPr lang="en-US"/>
-          </a:p>
-        </p:txBody>
-      </p:sp>
-      <p:sp>
-        <p:nvSpPr>
-          <p:cNvPr id="591" name="Shape 591"/>
-          <p:cNvSpPr txBox="1">
-            <a:spLocks noGrp="1"/>
-          </p:cNvSpPr>
-          <p:nvPr>
-            <p:ph type="body" idx="1"/>
-          </p:nvPr>
-        </p:nvSpPr>
-        <p:spPr>
-          <a:xfrm>
-            <a:off x="592137" y="1676400"/>
-            <a:ext cx="8229600" cy="4267200"/>
-          </a:xfrm>
-          <a:prstGeom prst="rect">
-            <a:avLst/>
-          </a:prstGeom>
-        </p:spPr>
-        <p:txBody>
-          <a:bodyPr wrap="square" lIns="91425" tIns="91425" rIns="91425" bIns="91425" anchor="t" anchorCtr="0">
-            <a:noAutofit/>
-          </a:bodyPr>
-          <a:lstStyle/>
-          <a:p>
-            <a:pPr lvl="0">
-              <a:spcBef>
-                <a:spcPts val="0"/>
-              </a:spcBef>
-              <a:buNone/>
-            </a:pPr>
-            <a:endParaRPr/>
-          </a:p>
-        </p:txBody>
-      </p:sp>
-      <p:sp>
-        <p:nvSpPr>
-          <p:cNvPr id="592" name="Shape 592"/>
-          <p:cNvSpPr txBox="1">
-            <a:spLocks noGrp="1"/>
-          </p:cNvSpPr>
-          <p:nvPr>
-            <p:ph type="sldNum" idx="12"/>
-          </p:nvPr>
-        </p:nvSpPr>
-        <p:spPr>
-          <a:xfrm>
-            <a:off x="8077200" y="6553200"/>
-            <a:ext cx="838200" cy="228600"/>
-          </a:xfrm>
-          <a:prstGeom prst="rect">
-            <a:avLst/>
-          </a:prstGeom>
-        </p:spPr>
-        <p:txBody>
-          <a:bodyPr wrap="square" lIns="91425" tIns="45700" rIns="91425" bIns="45700" anchor="t" anchorCtr="0">
-            <a:noAutofit/>
-          </a:bodyPr>
-          <a:lstStyle/>
-          <a:p>
-            <a:pPr lvl="0">
-              <a:spcBef>
-                <a:spcPts val="0"/>
-              </a:spcBef>
-              <a:buClr>
-                <a:schemeClr val="lt2"/>
-              </a:buClr>
-              <a:buSzPct val="25000"/>
-              <a:buFont typeface="Arial"/>
-              <a:buNone/>
-            </a:pPr>
-            <a:fld id="{00000000-1234-1234-1234-123412341234}" type="slidenum">
-              <a:rPr lang="en-US"/>
-              <a:t>8</a:t>
-            </a:fld>
-            <a:endParaRPr lang="en-US"/>
           </a:p>
         </p:txBody>
       </p:sp>
       <p:pic>
         <p:nvPicPr>
-          <p:cNvPr id="593" name="Shape 593"/>
+          <p:cNvPr id="576" name="Shape 576" descr="commit_message_header.png"/>
           <p:cNvPicPr preferRelativeResize="0"/>
           <p:nvPr/>
         </p:nvPicPr>
-        <p:blipFill>
+        <p:blipFill rotWithShape="1">
           <a:blip r:embed="rId3">
             <a:alphaModFix/>
           </a:blip>
-          <a:stretch>
-            <a:fillRect/>
-          </a:stretch>
+          <a:srcRect t="31307"/>
+          <a:stretch/>
         </p:blipFill>
         <p:spPr>
           <a:xfrm>
-            <a:off x="0" y="928125"/>
-            <a:ext cx="9143999" cy="5929875"/>
+            <a:off x="0" y="2954867"/>
+            <a:ext cx="9144000" cy="2721558"/>
           </a:xfrm>
           <a:prstGeom prst="rect">
             <a:avLst/>
@@ -10849,7 +10877,133 @@
       </p:pic>
       <p:sp>
         <p:nvSpPr>
-          <p:cNvPr id="2" name="Footer Placeholder 1" hidden="1"/>
+          <p:cNvPr id="2" name="TextBox 1"/>
+          <p:cNvSpPr txBox="1"/>
+          <p:nvPr/>
+        </p:nvSpPr>
+        <p:spPr>
+          <a:xfrm>
+            <a:off x="8467" y="1295400"/>
+            <a:ext cx="9067800" cy="1200329"/>
+          </a:xfrm>
+          <a:prstGeom prst="rect">
+            <a:avLst/>
+          </a:prstGeom>
+          <a:noFill/>
+        </p:spPr>
+        <p:txBody>
+          <a:bodyPr wrap="square" rtlCol="0">
+            <a:spAutoFit/>
+          </a:bodyPr>
+          <a:lstStyle/>
+          <a:p>
+            <a:r>
+              <a:rPr lang="en-US" sz="2400" dirty="0" smtClean="0"/>
+              <a:t>Limit commit message </a:t>
+            </a:r>
+            <a:r>
+              <a:rPr lang="en-US" sz="2400" dirty="0" smtClean="0"/>
+              <a:t>Subject </a:t>
+            </a:r>
+            <a:r>
+              <a:rPr lang="en-US" sz="2400" dirty="0" smtClean="0"/>
+              <a:t>to 70 chars and it must be simple, clear, self explained – this is the line all will see!</a:t>
+            </a:r>
+          </a:p>
+          <a:p>
+            <a:r>
+              <a:rPr lang="en-US" sz="2400" dirty="0" smtClean="0"/>
+              <a:t>Meaningful details </a:t>
+            </a:r>
+            <a:r>
+              <a:rPr lang="en-US" sz="2400" dirty="0" smtClean="0"/>
+              <a:t>put in </a:t>
+            </a:r>
+            <a:r>
+              <a:rPr lang="en-US" sz="2400" dirty="0" smtClean="0"/>
+              <a:t>the </a:t>
+            </a:r>
+            <a:r>
+              <a:rPr lang="en-US" sz="2400" dirty="0" smtClean="0"/>
+              <a:t>body of </a:t>
+            </a:r>
+            <a:r>
+              <a:rPr lang="en-US" sz="2400" dirty="0" smtClean="0"/>
+              <a:t>the </a:t>
+            </a:r>
+            <a:r>
+              <a:rPr lang="en-US" sz="2400" dirty="0" smtClean="0"/>
+              <a:t>commit message</a:t>
+            </a:r>
+            <a:endParaRPr lang="en-US" sz="2400" dirty="0"/>
+          </a:p>
+        </p:txBody>
+      </p:sp>
+      <p:sp>
+        <p:nvSpPr>
+          <p:cNvPr id="4" name="TextBox 3"/>
+          <p:cNvSpPr txBox="1"/>
+          <p:nvPr/>
+        </p:nvSpPr>
+        <p:spPr>
+          <a:xfrm>
+            <a:off x="228600" y="6219855"/>
+            <a:ext cx="8763000" cy="400110"/>
+          </a:xfrm>
+          <a:prstGeom prst="rect">
+            <a:avLst/>
+          </a:prstGeom>
+          <a:noFill/>
+        </p:spPr>
+        <p:txBody>
+          <a:bodyPr wrap="square" rtlCol="0">
+            <a:spAutoFit/>
+          </a:bodyPr>
+          <a:lstStyle/>
+          <a:p>
+            <a:r>
+              <a:rPr lang="en-US" sz="2000" dirty="0" smtClean="0">
+                <a:hlinkClick r:id="rId4"/>
+              </a:rPr>
+              <a:t>https://github.com/datreeio/node-datreeio/commits/master</a:t>
+            </a:r>
+            <a:endParaRPr lang="en-US" sz="2000" dirty="0"/>
+          </a:p>
+        </p:txBody>
+      </p:sp>
+      <p:sp>
+        <p:nvSpPr>
+          <p:cNvPr id="3" name="TextBox 2"/>
+          <p:cNvSpPr txBox="1"/>
+          <p:nvPr/>
+        </p:nvSpPr>
+        <p:spPr>
+          <a:xfrm>
+            <a:off x="228600" y="5659253"/>
+            <a:ext cx="2895600" cy="400110"/>
+          </a:xfrm>
+          <a:prstGeom prst="rect">
+            <a:avLst/>
+          </a:prstGeom>
+          <a:noFill/>
+        </p:spPr>
+        <p:txBody>
+          <a:bodyPr wrap="square" rtlCol="0">
+            <a:spAutoFit/>
+          </a:bodyPr>
+          <a:lstStyle/>
+          <a:p>
+            <a:r>
+              <a:rPr lang="en-US" sz="2000" dirty="0" smtClean="0"/>
+              <a:t>Demo: Example:</a:t>
+            </a:r>
+            <a:endParaRPr lang="en-US" sz="2000" dirty="0"/>
+          </a:p>
+        </p:txBody>
+      </p:sp>
+      <p:sp>
+        <p:nvSpPr>
+          <p:cNvPr id="5" name="Footer Placeholder 4" hidden="1"/>
           <p:cNvSpPr>
             <a:spLocks noGrp="1"/>
           </p:cNvSpPr>
@@ -10868,7 +11022,7 @@
       </p:sp>
       <p:sp>
         <p:nvSpPr>
-          <p:cNvPr id="3" name="Date Placeholder 2" hidden="1"/>
+          <p:cNvPr id="6" name="Date Placeholder 5" hidden="1"/>
           <p:cNvSpPr>
             <a:spLocks noGrp="1"/>
           </p:cNvSpPr>
@@ -10905,7 +11059,7 @@
   <p:cSld>
     <p:spTree>
       <p:nvGrpSpPr>
-        <p:cNvPr id="1" name="Shape 597"/>
+        <p:cNvPr id="1" name="Shape 589"/>
         <p:cNvGrpSpPr/>
         <p:nvPr/>
       </p:nvGrpSpPr>
@@ -10919,7 +11073,7 @@
       </p:grpSpPr>
       <p:sp>
         <p:nvSpPr>
-          <p:cNvPr id="598" name="Shape 598"/>
+          <p:cNvPr id="590" name="Shape 590"/>
           <p:cNvSpPr txBox="1">
             <a:spLocks noGrp="1"/>
           </p:cNvSpPr>
@@ -10929,33 +11083,23 @@
         </p:nvSpPr>
         <p:spPr>
           <a:xfrm>
-            <a:off x="0" y="0"/>
-            <a:ext cx="9144000" cy="682500"/>
-          </a:xfrm>
-          <a:prstGeom prst="rect">
-            <a:avLst/>
-          </a:prstGeom>
-          <a:noFill/>
-          <a:ln>
-            <a:noFill/>
-          </a:ln>
-        </p:spPr>
-        <p:txBody>
-          <a:bodyPr wrap="square" lIns="91425" tIns="45700" rIns="91425" bIns="45700" anchor="t" anchorCtr="0">
+            <a:off x="12" y="0"/>
+            <a:ext cx="8229600" cy="758700"/>
+          </a:xfrm>
+          <a:prstGeom prst="rect">
+            <a:avLst/>
+          </a:prstGeom>
+        </p:spPr>
+        <p:txBody>
+          <a:bodyPr wrap="square" lIns="91425" tIns="91425" rIns="91425" bIns="91425" anchor="t" anchorCtr="0">
             <a:noAutofit/>
           </a:bodyPr>
           <a:lstStyle/>
           <a:p>
-            <a:pPr marL="0" marR="0" lvl="0" indent="0" algn="l" rtl="0">
-              <a:lnSpc>
-                <a:spcPct val="100000"/>
-              </a:lnSpc>
-              <a:spcBef>
-                <a:spcPts val="0"/>
-              </a:spcBef>
-              <a:spcAft>
-                <a:spcPts val="0"/>
-              </a:spcAft>
+            <a:pPr lvl="0">
+              <a:spcBef>
+                <a:spcPts val="0"/>
+              </a:spcBef>
               <a:buClr>
                 <a:schemeClr val="dk2"/>
               </a:buClr>
@@ -10964,70 +11108,69 @@
               <a:buNone/>
             </a:pPr>
             <a:r>
-              <a:rPr lang="en-US" sz="3400" b="0" i="0" u="none" strike="noStrike" cap="none">
-                <a:solidFill>
-                  <a:schemeClr val="dk2"/>
-                </a:solidFill>
-                <a:latin typeface="Arial"/>
-                <a:ea typeface="Arial"/>
-                <a:cs typeface="Arial"/>
-                <a:sym typeface="Arial"/>
-              </a:rPr>
-              <a:t>Best practices – clean up local branches</a:t>
-            </a:r>
-            <a:r>
-              <a:rPr lang="en-US" sz="2400" b="0" i="0" u="none" strike="noStrike" cap="none">
-                <a:solidFill>
-                  <a:schemeClr val="dk2"/>
-                </a:solidFill>
-                <a:latin typeface="Arial"/>
-                <a:ea typeface="Arial"/>
-                <a:cs typeface="Arial"/>
-                <a:sym typeface="Arial"/>
-              </a:rPr>
-              <a:t/>
+              <a:rPr lang="en-US"/>
+              <a:t>Best practices – Branch Layout</a:t>
             </a:r>
             <a:br>
-              <a:rPr lang="en-US" sz="2400" b="0" i="0" u="none" strike="noStrike" cap="none">
-                <a:solidFill>
-                  <a:schemeClr val="dk2"/>
-                </a:solidFill>
-                <a:latin typeface="Arial"/>
-                <a:ea typeface="Arial"/>
-                <a:cs typeface="Arial"/>
-                <a:sym typeface="Arial"/>
-              </a:rPr>
+              <a:rPr lang="en-US"/>
             </a:br>
-            <a:endParaRPr lang="en-US" sz="2400" b="0" i="0" u="none" strike="noStrike" cap="none">
-              <a:solidFill>
-                <a:schemeClr val="dk2"/>
-              </a:solidFill>
-              <a:latin typeface="Arial"/>
-              <a:ea typeface="Arial"/>
-              <a:cs typeface="Arial"/>
-              <a:sym typeface="Arial"/>
-            </a:endParaRPr>
-          </a:p>
-        </p:txBody>
-      </p:sp>
-      <p:sp>
-        <p:nvSpPr>
-          <p:cNvPr id="599" name="Shape 599"/>
-          <p:cNvSpPr txBox="1"/>
-          <p:nvPr/>
-        </p:nvSpPr>
-        <p:spPr>
-          <a:xfrm>
-            <a:off x="6477000" y="6553200"/>
-            <a:ext cx="1524000" cy="228600"/>
-          </a:xfrm>
-          <a:prstGeom prst="rect">
-            <a:avLst/>
-          </a:prstGeom>
-          <a:noFill/>
-          <a:ln>
-            <a:noFill/>
-          </a:ln>
+            <a:endParaRPr lang="en-US"/>
+          </a:p>
+        </p:txBody>
+      </p:sp>
+      <p:sp>
+        <p:nvSpPr>
+          <p:cNvPr id="591" name="Shape 591"/>
+          <p:cNvSpPr txBox="1">
+            <a:spLocks noGrp="1"/>
+          </p:cNvSpPr>
+          <p:nvPr>
+            <p:ph type="body" idx="1"/>
+          </p:nvPr>
+        </p:nvSpPr>
+        <p:spPr>
+          <a:xfrm>
+            <a:off x="592137" y="1676400"/>
+            <a:ext cx="8229600" cy="4267200"/>
+          </a:xfrm>
+          <a:prstGeom prst="rect">
+            <a:avLst/>
+          </a:prstGeom>
+        </p:spPr>
+        <p:txBody>
+          <a:bodyPr wrap="square" lIns="91425" tIns="91425" rIns="91425" bIns="91425" anchor="t" anchorCtr="0">
+            <a:noAutofit/>
+          </a:bodyPr>
+          <a:lstStyle/>
+          <a:p>
+            <a:pPr lvl="0">
+              <a:spcBef>
+                <a:spcPts val="0"/>
+              </a:spcBef>
+              <a:buNone/>
+            </a:pPr>
+            <a:endParaRPr/>
+          </a:p>
+        </p:txBody>
+      </p:sp>
+      <p:sp>
+        <p:nvSpPr>
+          <p:cNvPr id="592" name="Shape 592"/>
+          <p:cNvSpPr txBox="1">
+            <a:spLocks noGrp="1"/>
+          </p:cNvSpPr>
+          <p:nvPr>
+            <p:ph type="sldNum" idx="12"/>
+          </p:nvPr>
+        </p:nvSpPr>
+        <p:spPr>
+          <a:xfrm>
+            <a:off x="8077200" y="6553200"/>
+            <a:ext cx="838200" cy="228600"/>
+          </a:xfrm>
+          <a:prstGeom prst="rect">
+            <a:avLst/>
+          </a:prstGeom>
         </p:spPr>
         <p:txBody>
           <a:bodyPr wrap="square" lIns="91425" tIns="45700" rIns="91425" bIns="45700" anchor="t" anchorCtr="0">
@@ -11035,16 +11178,10 @@
           </a:bodyPr>
           <a:lstStyle/>
           <a:p>
-            <a:pPr marL="0" marR="0" lvl="0" indent="0" algn="l" rtl="0">
-              <a:lnSpc>
-                <a:spcPct val="100000"/>
-              </a:lnSpc>
-              <a:spcBef>
-                <a:spcPts val="0"/>
-              </a:spcBef>
-              <a:spcAft>
-                <a:spcPts val="0"/>
-              </a:spcAft>
+            <a:pPr lvl="0">
+              <a:spcBef>
+                <a:spcPts val="0"/>
+              </a:spcBef>
               <a:buClr>
                 <a:schemeClr val="lt2"/>
               </a:buClr>
@@ -11052,90 +11189,17 @@
               <a:buFont typeface="Arial"/>
               <a:buNone/>
             </a:pPr>
-            <a:r>
-              <a:rPr lang="en-US" sz="700" b="0" i="0" u="none">
-                <a:solidFill>
-                  <a:schemeClr val="lt2"/>
-                </a:solidFill>
-                <a:latin typeface="Arial"/>
-                <a:ea typeface="Arial"/>
-                <a:cs typeface="Arial"/>
-                <a:sym typeface="Arial"/>
-              </a:rPr>
-              <a:t>*</a:t>
-            </a:r>
-          </a:p>
-        </p:txBody>
-      </p:sp>
-      <p:sp>
-        <p:nvSpPr>
-          <p:cNvPr id="600" name="Shape 600"/>
-          <p:cNvSpPr txBox="1"/>
-          <p:nvPr/>
-        </p:nvSpPr>
-        <p:spPr>
-          <a:xfrm>
-            <a:off x="8077200" y="6553200"/>
-            <a:ext cx="838200" cy="228600"/>
-          </a:xfrm>
-          <a:prstGeom prst="rect">
-            <a:avLst/>
-          </a:prstGeom>
-          <a:noFill/>
-          <a:ln>
-            <a:noFill/>
-          </a:ln>
-        </p:spPr>
-        <p:txBody>
-          <a:bodyPr wrap="square" lIns="91425" tIns="45700" rIns="91425" bIns="45700" anchor="t" anchorCtr="0">
-            <a:noAutofit/>
-          </a:bodyPr>
-          <a:lstStyle/>
-          <a:p>
-            <a:pPr marL="0" marR="0" lvl="0" indent="0" algn="r" rtl="0">
-              <a:lnSpc>
-                <a:spcPct val="100000"/>
-              </a:lnSpc>
-              <a:spcBef>
-                <a:spcPts val="0"/>
-              </a:spcBef>
-              <a:spcAft>
-                <a:spcPts val="0"/>
-              </a:spcAft>
-              <a:buClr>
-                <a:schemeClr val="lt2"/>
-              </a:buClr>
-              <a:buSzPct val="25000"/>
-              <a:buFont typeface="Arial"/>
-              <a:buNone/>
-            </a:pPr>
             <a:fld id="{00000000-1234-1234-1234-123412341234}" type="slidenum">
-              <a:rPr lang="en-US" sz="700" b="0" i="0" u="none">
-                <a:solidFill>
-                  <a:schemeClr val="lt2"/>
-                </a:solidFill>
-                <a:latin typeface="Arial"/>
-                <a:ea typeface="Arial"/>
-                <a:cs typeface="Arial"/>
-                <a:sym typeface="Arial"/>
-              </a:rPr>
+              <a:rPr lang="en-US"/>
               <a:t>9</a:t>
             </a:fld>
-            <a:endParaRPr lang="en-US" sz="700" b="0" i="0" u="none">
-              <a:solidFill>
-                <a:schemeClr val="lt2"/>
-              </a:solidFill>
-              <a:latin typeface="Arial"/>
-              <a:ea typeface="Arial"/>
-              <a:cs typeface="Arial"/>
-              <a:sym typeface="Arial"/>
-            </a:endParaRPr>
+            <a:endParaRPr lang="en-US"/>
           </a:p>
         </p:txBody>
       </p:sp>
       <p:pic>
         <p:nvPicPr>
-          <p:cNvPr id="601" name="Shape 601" descr="Delete_local_feature_branch.png"/>
+          <p:cNvPr id="593" name="Shape 593"/>
           <p:cNvPicPr preferRelativeResize="0"/>
           <p:nvPr/>
         </p:nvPicPr>
@@ -11149,8 +11213,8 @@
         </p:blipFill>
         <p:spPr>
           <a:xfrm>
-            <a:off x="0" y="1047850"/>
-            <a:ext cx="9144001" cy="5733950"/>
+            <a:off x="0" y="928125"/>
+            <a:ext cx="9143999" cy="5929875"/>
           </a:xfrm>
           <a:prstGeom prst="rect">
             <a:avLst/>
@@ -11204,6 +11268,13 @@
   <p:clrMapOvr>
     <a:masterClrMapping/>
   </p:clrMapOvr>
+  <p:timing>
+    <p:tnLst>
+      <p:par>
+        <p:cTn id="1" dur="indefinite" restart="never" nodeType="tmRoot"/>
+      </p:par>
+    </p:tnLst>
+  </p:timing>
 </p:sld>
 </file>
 

</xml_diff>

<commit_message>
git best pract latest
</commit_message>
<xml_diff>
--- a/WorkStuff/Courses/Git/Git_Best_Practices/Git_Best_Practices.pptx
+++ b/WorkStuff/Courses/Git/Git_Best_Practices/Git_Best_Practices.pptx
@@ -5,7 +5,7 @@
     <p:sldMasterId id="2147483660" r:id="rId1"/>
   </p:sldMasterIdLst>
   <p:notesMasterIdLst>
-    <p:notesMasterId r:id="rId13"/>
+    <p:notesMasterId r:id="rId14"/>
   </p:notesMasterIdLst>
   <p:sldIdLst>
     <p:sldId id="256" r:id="rId2"/>
@@ -19,26 +19,27 @@
     <p:sldId id="292" r:id="rId10"/>
     <p:sldId id="294" r:id="rId11"/>
     <p:sldId id="298" r:id="rId12"/>
+    <p:sldId id="299" r:id="rId13"/>
   </p:sldIdLst>
   <p:sldSz cx="9144000" cy="6858000" type="screen4x3"/>
   <p:notesSz cx="6934200" cy="9232900"/>
   <p:embeddedFontLst>
     <p:embeddedFont>
-      <p:font typeface="Merriweather" panose="020B0604020202020204" charset="0"/>
-      <p:regular r:id="rId14"/>
-      <p:bold r:id="rId15"/>
-      <p:italic r:id="rId16"/>
-      <p:boldItalic r:id="rId17"/>
-    </p:embeddedFont>
-    <p:embeddedFont>
       <p:font typeface="Amatic SC" panose="020B0604020202020204" charset="-79"/>
-      <p:regular r:id="rId18"/>
-      <p:bold r:id="rId19"/>
+      <p:regular r:id="rId15"/>
+      <p:bold r:id="rId16"/>
     </p:embeddedFont>
     <p:embeddedFont>
       <p:font typeface="Source Code Pro" panose="020B0604020202020204" charset="0"/>
-      <p:regular r:id="rId20"/>
-      <p:bold r:id="rId21"/>
+      <p:regular r:id="rId17"/>
+      <p:bold r:id="rId18"/>
+    </p:embeddedFont>
+    <p:embeddedFont>
+      <p:font typeface="Merriweather" panose="020B0604020202020204" charset="0"/>
+      <p:regular r:id="rId19"/>
+      <p:bold r:id="rId20"/>
+      <p:italic r:id="rId21"/>
+      <p:boldItalic r:id="rId22"/>
     </p:embeddedFont>
   </p:embeddedFontLst>
   <p:defaultTextStyle>
@@ -2913,7 +2914,7 @@
           <a:p>
             <a:fld id="{559FE8C8-AC97-4ADA-A254-8F11A723A69F}" type="datetimeFigureOut">
               <a:rPr lang="en-US" smtClean="0"/>
-              <a:t>6/25/2019</a:t>
+              <a:t>6/27/2019</a:t>
             </a:fld>
             <a:endParaRPr lang="en-US"/>
           </a:p>
@@ -3334,7 +3335,7 @@
           <a:p>
             <a:fld id="{B88F23AA-34D9-4A18-A5A1-06793324E42C}" type="datetimeFigureOut">
               <a:rPr lang="en-US" smtClean="0"/>
-              <a:t>6/25/2019</a:t>
+              <a:t>6/27/2019</a:t>
             </a:fld>
             <a:endParaRPr lang="en-US"/>
           </a:p>
@@ -3456,7 +3457,7 @@
           <a:p>
             <a:fld id="{8DA20C1D-75ED-450C-88C7-C497EA874E9C}" type="datetimeFigureOut">
               <a:rPr lang="en-US" smtClean="0"/>
-              <a:t>6/25/2019</a:t>
+              <a:t>6/27/2019</a:t>
             </a:fld>
             <a:endParaRPr lang="en-US"/>
           </a:p>
@@ -4650,7 +4651,7 @@
           <a:p>
             <a:fld id="{FEFA0557-7C35-4D1D-B97A-95898D157B33}" type="datetimeFigureOut">
               <a:rPr lang="en-US" smtClean="0"/>
-              <a:t>6/25/2019</a:t>
+              <a:t>6/27/2019</a:t>
             </a:fld>
             <a:endParaRPr lang="en-US"/>
           </a:p>
@@ -4936,7 +4937,7 @@
           <a:p>
             <a:fld id="{B236AB90-F632-4852-BC4B-53E103869F3D}" type="datetimeFigureOut">
               <a:rPr lang="en-US" smtClean="0"/>
-              <a:t>6/25/2019</a:t>
+              <a:t>6/27/2019</a:t>
             </a:fld>
             <a:endParaRPr lang="en-US"/>
           </a:p>
@@ -5322,7 +5323,7 @@
           <a:p>
             <a:fld id="{12374C44-A702-4728-BB40-76FE555B9CF1}" type="datetimeFigureOut">
               <a:rPr lang="en-US" smtClean="0"/>
-              <a:t>6/25/2019</a:t>
+              <a:t>6/27/2019</a:t>
             </a:fld>
             <a:endParaRPr lang="en-US"/>
           </a:p>
@@ -5535,7 +5536,7 @@
           <a:p>
             <a:fld id="{E1F32DF0-702E-431A-ADCF-2A06AC4E7F57}" type="datetimeFigureOut">
               <a:rPr lang="en-US" smtClean="0"/>
-              <a:t>6/25/2019</a:t>
+              <a:t>6/27/2019</a:t>
             </a:fld>
             <a:endParaRPr lang="en-US"/>
           </a:p>
@@ -5839,7 +5840,7 @@
           <a:p>
             <a:fld id="{DBDC1F8B-7509-4E85-ABDB-3F1EEA772746}" type="datetimeFigureOut">
               <a:rPr lang="en-US" smtClean="0"/>
-              <a:t>6/25/2019</a:t>
+              <a:t>6/27/2019</a:t>
             </a:fld>
             <a:endParaRPr lang="en-US"/>
           </a:p>
@@ -6131,7 +6132,7 @@
           <a:p>
             <a:fld id="{52C5D9E0-CA9E-46E5-9606-B0D66E683FEE}" type="datetimeFigureOut">
               <a:rPr lang="en-US" smtClean="0"/>
-              <a:t>6/25/2019</a:t>
+              <a:t>6/27/2019</a:t>
             </a:fld>
             <a:endParaRPr lang="en-US"/>
           </a:p>
@@ -6705,7 +6706,7 @@
           <a:p>
             <a:fld id="{5BA37E64-D101-4693-B362-74BB0158B47B}" type="datetimeFigureOut">
               <a:rPr lang="en-US" smtClean="0"/>
-              <a:t>6/25/2019</a:t>
+              <a:t>6/27/2019</a:t>
             </a:fld>
             <a:endParaRPr lang="en-US"/>
           </a:p>
@@ -6881,7 +6882,7 @@
           <a:p>
             <a:fld id="{FACA2033-B529-4F88-BF0F-C9E77C7AF715}" type="datetimeFigureOut">
               <a:rPr lang="en-US" smtClean="0"/>
-              <a:t>6/25/2019</a:t>
+              <a:t>6/27/2019</a:t>
             </a:fld>
             <a:endParaRPr lang="en-US"/>
           </a:p>
@@ -7521,7 +7522,7 @@
           <a:p>
             <a:fld id="{2F850279-8577-4DB5-A1B1-2A1239DFFE30}" type="datetimeFigureOut">
               <a:rPr lang="en-US" smtClean="0"/>
-              <a:t>6/25/2019</a:t>
+              <a:t>6/27/2019</a:t>
             </a:fld>
             <a:endParaRPr lang="en-US"/>
           </a:p>
@@ -8706,8 +8707,8 @@
         </p:nvSpPr>
         <p:spPr>
           <a:xfrm>
-            <a:off x="292100" y="533400"/>
-            <a:ext cx="8229600" cy="1371600"/>
+            <a:off x="261013" y="152400"/>
+            <a:ext cx="8229600" cy="838200"/>
           </a:xfrm>
           <a:prstGeom prst="rect">
             <a:avLst/>
@@ -8723,22 +8724,11 @@
           </a:bodyPr>
           <a:lstStyle/>
           <a:p>
-            <a:pPr marL="0" marR="0" lvl="0" indent="0" algn="ctr" rtl="0">
-              <a:lnSpc>
-                <a:spcPct val="100000"/>
-              </a:lnSpc>
-              <a:spcBef>
-                <a:spcPts val="0"/>
-              </a:spcBef>
-              <a:spcAft>
-                <a:spcPts val="0"/>
-              </a:spcAft>
+            <a:pPr lvl="0" algn="ctr">
               <a:buClr>
                 <a:schemeClr val="dk2"/>
               </a:buClr>
               <a:buSzPct val="25000"/>
-              <a:buFont typeface="Arial"/>
-              <a:buNone/>
             </a:pPr>
             <a:r>
               <a:rPr lang="en-US" sz="4400" b="0" i="0" u="none" strike="noStrike" cap="none" dirty="0" smtClean="0">
@@ -8750,7 +8740,7 @@
                 <a:cs typeface="Arial"/>
                 <a:sym typeface="Arial"/>
               </a:rPr>
-              <a:t>Question?</a:t>
+              <a:t>Questions?</a:t>
             </a:r>
             <a:r>
               <a:rPr lang="en-US" sz="4400" dirty="0" smtClean="0"/>
@@ -8768,37 +8758,51 @@
             </a:br>
             <a:r>
               <a:rPr lang="en-US" sz="4400" dirty="0" smtClean="0"/>
-              <a:t/>
+              <a:t>Summary</a:t>
             </a:r>
             <a:br>
               <a:rPr lang="en-US" sz="4400" dirty="0" smtClean="0"/>
             </a:br>
             <a:r>
+              <a:rPr lang="en-US" sz="4400" dirty="0"/>
+              <a:t/>
+            </a:r>
+            <a:br>
+              <a:rPr lang="en-US" sz="4400" dirty="0"/>
+            </a:br>
+            <a:r>
               <a:rPr lang="en-US" sz="4400" dirty="0" smtClean="0"/>
-              <a:t>Ilya Rokhkin (Git Trainings)</a:t>
+              <a:t>Ilya </a:t>
+            </a:r>
+            <a:r>
+              <a:rPr lang="en-US" sz="4400" dirty="0" smtClean="0"/>
+              <a:t>Rokhkin (Git Trainings</a:t>
+            </a:r>
+            <a:r>
+              <a:rPr lang="en-US" sz="4400" dirty="0" smtClean="0"/>
+              <a:t>)</a:t>
             </a:r>
             <a:br>
               <a:rPr lang="en-US" sz="4400" dirty="0" smtClean="0"/>
             </a:br>
             <a:r>
-              <a:rPr lang="en-US" sz="4400" dirty="0" smtClean="0">
+              <a:rPr lang="en-US" sz="2800" dirty="0">
                 <a:hlinkClick r:id="rId3"/>
               </a:rPr>
-              <a:t>rokhkin_ilya@yahoo.com</a:t>
+              <a:t>https://</a:t>
             </a:r>
             <a:r>
-              <a:rPr lang="en-US" sz="4400" dirty="0" smtClean="0"/>
+              <a:rPr lang="en-US" sz="2800" dirty="0" smtClean="0">
+                <a:hlinkClick r:id="rId3"/>
+              </a:rPr>
+              <a:t>github.com/ilyaro/git_best_practices_ppt</a:t>
+            </a:r>
+            <a:r>
+              <a:rPr lang="en-US" sz="2800" dirty="0" smtClean="0"/>
               <a:t/>
             </a:r>
             <a:br>
-              <a:rPr lang="en-US" sz="4400" dirty="0" smtClean="0"/>
-            </a:br>
-            <a:r>
-              <a:rPr lang="en-US" sz="4400" dirty="0" smtClean="0"/>
-              <a:t>054-5224805</a:t>
-            </a:r>
-            <a:br>
-              <a:rPr lang="en-US" sz="4400" dirty="0" smtClean="0"/>
+              <a:rPr lang="en-US" sz="2800" dirty="0" smtClean="0"/>
             </a:br>
             <a:r>
               <a:rPr lang="en-US" sz="4400" dirty="0" smtClean="0"/>
@@ -8808,9 +8812,32 @@
               <a:rPr lang="en-US" sz="4400" dirty="0" smtClean="0"/>
             </a:br>
             <a:r>
+              <a:rPr lang="en-US" sz="4000" dirty="0" smtClean="0">
+                <a:hlinkClick r:id="rId4"/>
+              </a:rPr>
+              <a:t>rokhkin_ilya@yahoo.com</a:t>
+            </a:r>
+            <a:r>
+              <a:rPr lang="en-US" sz="4000" dirty="0" smtClean="0"/>
+              <a:t/>
+            </a:r>
+            <a:br>
+              <a:rPr lang="en-US" sz="4000" dirty="0" smtClean="0"/>
+            </a:br>
+            <a:r>
+              <a:rPr lang="en-US" sz="4000" dirty="0" smtClean="0"/>
+              <a:t>054-5224805</a:t>
+            </a:r>
+            <a:br>
+              <a:rPr lang="en-US" sz="4000" dirty="0" smtClean="0"/>
+            </a:br>
+            <a:r>
               <a:rPr lang="en-US" sz="4400" dirty="0" smtClean="0"/>
-              <a:t>Thanks!</a:t>
+              <a:t/>
             </a:r>
+            <a:br>
+              <a:rPr lang="en-US" sz="4400" dirty="0" smtClean="0"/>
+            </a:br>
             <a:endParaRPr lang="en-US" sz="4400" dirty="0"/>
           </a:p>
         </p:txBody>
@@ -8980,6 +9007,148 @@
     <p:extLst>
       <p:ext uri="{BB962C8B-B14F-4D97-AF65-F5344CB8AC3E}">
         <p14:creationId xmlns:p14="http://schemas.microsoft.com/office/powerpoint/2010/main" val="1066355941"/>
+      </p:ext>
+    </p:extLst>
+  </p:cSld>
+  <p:clrMapOvr>
+    <a:masterClrMapping/>
+  </p:clrMapOvr>
+</p:sld>
+</file>
+
+<file path=ppt/slides/slide12.xml><?xml version="1.0" encoding="utf-8"?>
+<p:sld xmlns:a="http://schemas.openxmlformats.org/drawingml/2006/main" xmlns:r="http://schemas.openxmlformats.org/officeDocument/2006/relationships" xmlns:p="http://schemas.openxmlformats.org/presentationml/2006/main">
+  <p:cSld>
+    <p:spTree>
+      <p:nvGrpSpPr>
+        <p:cNvPr id="1" name=""/>
+        <p:cNvGrpSpPr/>
+        <p:nvPr/>
+      </p:nvGrpSpPr>
+      <p:grpSpPr>
+        <a:xfrm>
+          <a:off x="0" y="0"/>
+          <a:ext cx="0" cy="0"/>
+          <a:chOff x="0" y="0"/>
+          <a:chExt cx="0" cy="0"/>
+        </a:xfrm>
+      </p:grpSpPr>
+      <p:sp>
+        <p:nvSpPr>
+          <p:cNvPr id="2" name="Title 1"/>
+          <p:cNvSpPr>
+            <a:spLocks noGrp="1"/>
+          </p:cNvSpPr>
+          <p:nvPr>
+            <p:ph type="title"/>
+          </p:nvPr>
+        </p:nvSpPr>
+        <p:spPr/>
+        <p:txBody>
+          <a:bodyPr/>
+          <a:lstStyle/>
+          <a:p>
+            <a:pPr algn="ctr"/>
+            <a:r>
+              <a:rPr lang="en-US" dirty="0" smtClean="0"/>
+              <a:t>Git Best Practices</a:t>
+            </a:r>
+            <a:endParaRPr lang="en-US" dirty="0"/>
+          </a:p>
+        </p:txBody>
+      </p:sp>
+      <p:sp>
+        <p:nvSpPr>
+          <p:cNvPr id="3" name="Text Placeholder 2"/>
+          <p:cNvSpPr>
+            <a:spLocks noGrp="1"/>
+          </p:cNvSpPr>
+          <p:nvPr>
+            <p:ph type="body" idx="1"/>
+          </p:nvPr>
+        </p:nvSpPr>
+        <p:spPr/>
+        <p:txBody>
+          <a:bodyPr/>
+          <a:lstStyle/>
+          <a:p>
+            <a:pPr marL="127000" indent="0" algn="ctr">
+              <a:buNone/>
+            </a:pPr>
+            <a:endParaRPr lang="en-US" sz="4800" dirty="0" smtClean="0"/>
+          </a:p>
+          <a:p>
+            <a:pPr marL="127000" indent="0" algn="ctr">
+              <a:buNone/>
+            </a:pPr>
+            <a:r>
+              <a:rPr lang="en-US" sz="4800" dirty="0" smtClean="0"/>
+              <a:t>Thank You!</a:t>
+            </a:r>
+            <a:endParaRPr lang="en-US" sz="4800" dirty="0"/>
+          </a:p>
+        </p:txBody>
+      </p:sp>
+      <p:sp>
+        <p:nvSpPr>
+          <p:cNvPr id="4" name="Slide Number Placeholder 3"/>
+          <p:cNvSpPr>
+            <a:spLocks noGrp="1"/>
+          </p:cNvSpPr>
+          <p:nvPr>
+            <p:ph type="sldNum" idx="12"/>
+          </p:nvPr>
+        </p:nvSpPr>
+        <p:spPr/>
+        <p:txBody>
+          <a:bodyPr/>
+          <a:lstStyle/>
+          <a:p>
+            <a:pPr marL="0" marR="0" lvl="0" indent="0" algn="r" rtl="0">
+              <a:lnSpc>
+                <a:spcPct val="100000"/>
+              </a:lnSpc>
+              <a:spcBef>
+                <a:spcPts val="0"/>
+              </a:spcBef>
+              <a:spcAft>
+                <a:spcPts val="0"/>
+              </a:spcAft>
+              <a:buClr>
+                <a:schemeClr val="lt2"/>
+              </a:buClr>
+              <a:buSzPct val="25000"/>
+              <a:buFont typeface="Arial"/>
+              <a:buNone/>
+            </a:pPr>
+            <a:fld id="{00000000-1234-1234-1234-123412341234}" type="slidenum">
+              <a:rPr lang="en-US" sz="700" b="0" i="0" u="none" smtClean="0">
+                <a:solidFill>
+                  <a:schemeClr val="lt2"/>
+                </a:solidFill>
+                <a:latin typeface="Arial"/>
+                <a:ea typeface="Arial"/>
+                <a:cs typeface="Arial"/>
+                <a:sym typeface="Arial"/>
+              </a:rPr>
+              <a:t>12</a:t>
+            </a:fld>
+            <a:endParaRPr lang="en-US" sz="700" b="0" i="0" u="none">
+              <a:solidFill>
+                <a:schemeClr val="lt2"/>
+              </a:solidFill>
+              <a:latin typeface="Arial"/>
+              <a:ea typeface="Arial"/>
+              <a:cs typeface="Arial"/>
+              <a:sym typeface="Arial"/>
+            </a:endParaRPr>
+          </a:p>
+        </p:txBody>
+      </p:sp>
+    </p:spTree>
+    <p:extLst>
+      <p:ext uri="{BB962C8B-B14F-4D97-AF65-F5344CB8AC3E}">
+        <p14:creationId xmlns:p14="http://schemas.microsoft.com/office/powerpoint/2010/main" val="21745747"/>
       </p:ext>
     </p:extLst>
   </p:cSld>
@@ -10416,11 +10585,7 @@
           <a:p>
             <a:r>
               <a:rPr lang="en-US" sz="2400" dirty="0" smtClean="0"/>
-              <a:t>Demo: git </a:t>
-            </a:r>
-            <a:r>
-              <a:rPr lang="en-US" sz="2400" dirty="0" smtClean="0"/>
-              <a:t>merge --squash</a:t>
+              <a:t>Demo: git merge --squash</a:t>
             </a:r>
             <a:endParaRPr lang="en-US" sz="2400" dirty="0"/>
           </a:p>
@@ -10899,41 +11064,13 @@
           <a:p>
             <a:r>
               <a:rPr lang="en-US" sz="2400" dirty="0" smtClean="0"/>
-              <a:t>Limit commit message </a:t>
+              <a:t>Limit commit message Subject to 70 chars and it must be simple, clear, self explained – this is the line all will see!</a:t>
             </a:r>
+          </a:p>
+          <a:p>
             <a:r>
               <a:rPr lang="en-US" sz="2400" dirty="0" smtClean="0"/>
-              <a:t>Subject </a:t>
-            </a:r>
-            <a:r>
-              <a:rPr lang="en-US" sz="2400" dirty="0" smtClean="0"/>
-              <a:t>to 70 chars and it must be simple, clear, self explained – this is the line all will see!</a:t>
-            </a:r>
-          </a:p>
-          <a:p>
-            <a:r>
-              <a:rPr lang="en-US" sz="2400" dirty="0" smtClean="0"/>
-              <a:t>Meaningful details </a:t>
-            </a:r>
-            <a:r>
-              <a:rPr lang="en-US" sz="2400" dirty="0" smtClean="0"/>
-              <a:t>put in </a:t>
-            </a:r>
-            <a:r>
-              <a:rPr lang="en-US" sz="2400" dirty="0" smtClean="0"/>
-              <a:t>the </a:t>
-            </a:r>
-            <a:r>
-              <a:rPr lang="en-US" sz="2400" dirty="0" smtClean="0"/>
-              <a:t>body of </a:t>
-            </a:r>
-            <a:r>
-              <a:rPr lang="en-US" sz="2400" dirty="0" smtClean="0"/>
-              <a:t>the </a:t>
-            </a:r>
-            <a:r>
-              <a:rPr lang="en-US" sz="2400" dirty="0" smtClean="0"/>
-              <a:t>commit message</a:t>
+              <a:t>Meaningful details put in the body of the commit message</a:t>
             </a:r>
             <a:endParaRPr lang="en-US" sz="2400" dirty="0"/>
           </a:p>

</xml_diff>

<commit_message>
git gitlab best practices
</commit_message>
<xml_diff>
--- a/WorkStuff/Courses/Git/Git_Best_Practices/Git_Best_Practices.pptx
+++ b/WorkStuff/Courses/Git/Git_Best_Practices/Git_Best_Practices.pptx
@@ -5,7 +5,7 @@
     <p:sldMasterId id="2147483660" r:id="rId1"/>
   </p:sldMasterIdLst>
   <p:notesMasterIdLst>
-    <p:notesMasterId r:id="rId14"/>
+    <p:notesMasterId r:id="rId13"/>
   </p:notesMasterIdLst>
   <p:sldIdLst>
     <p:sldId id="256" r:id="rId2"/>
@@ -19,27 +19,26 @@
     <p:sldId id="292" r:id="rId10"/>
     <p:sldId id="294" r:id="rId11"/>
     <p:sldId id="298" r:id="rId12"/>
-    <p:sldId id="299" r:id="rId13"/>
   </p:sldIdLst>
   <p:sldSz cx="9144000" cy="6858000" type="screen4x3"/>
   <p:notesSz cx="6934200" cy="9232900"/>
   <p:embeddedFontLst>
     <p:embeddedFont>
+      <p:font typeface="Merriweather" panose="020B0604020202020204" charset="0"/>
+      <p:regular r:id="rId14"/>
+      <p:bold r:id="rId15"/>
+      <p:italic r:id="rId16"/>
+      <p:boldItalic r:id="rId17"/>
+    </p:embeddedFont>
+    <p:embeddedFont>
       <p:font typeface="Amatic SC" panose="020B0604020202020204" charset="-79"/>
-      <p:regular r:id="rId15"/>
-      <p:bold r:id="rId16"/>
+      <p:regular r:id="rId18"/>
+      <p:bold r:id="rId19"/>
     </p:embeddedFont>
     <p:embeddedFont>
       <p:font typeface="Source Code Pro" panose="020B0604020202020204" charset="0"/>
-      <p:regular r:id="rId17"/>
-      <p:bold r:id="rId18"/>
-    </p:embeddedFont>
-    <p:embeddedFont>
-      <p:font typeface="Merriweather" panose="020B0604020202020204" charset="0"/>
-      <p:regular r:id="rId19"/>
-      <p:bold r:id="rId20"/>
-      <p:italic r:id="rId21"/>
-      <p:boldItalic r:id="rId22"/>
+      <p:regular r:id="rId20"/>
+      <p:bold r:id="rId21"/>
     </p:embeddedFont>
   </p:embeddedFontLst>
   <p:defaultTextStyle>
@@ -2914,7 +2913,7 @@
           <a:p>
             <a:fld id="{559FE8C8-AC97-4ADA-A254-8F11A723A69F}" type="datetimeFigureOut">
               <a:rPr lang="en-US" smtClean="0"/>
-              <a:t>6/27/2019</a:t>
+              <a:t>6/25/2019</a:t>
             </a:fld>
             <a:endParaRPr lang="en-US"/>
           </a:p>
@@ -3335,7 +3334,7 @@
           <a:p>
             <a:fld id="{B88F23AA-34D9-4A18-A5A1-06793324E42C}" type="datetimeFigureOut">
               <a:rPr lang="en-US" smtClean="0"/>
-              <a:t>6/27/2019</a:t>
+              <a:t>6/25/2019</a:t>
             </a:fld>
             <a:endParaRPr lang="en-US"/>
           </a:p>
@@ -3457,7 +3456,7 @@
           <a:p>
             <a:fld id="{8DA20C1D-75ED-450C-88C7-C497EA874E9C}" type="datetimeFigureOut">
               <a:rPr lang="en-US" smtClean="0"/>
-              <a:t>6/27/2019</a:t>
+              <a:t>6/25/2019</a:t>
             </a:fld>
             <a:endParaRPr lang="en-US"/>
           </a:p>
@@ -4651,7 +4650,7 @@
           <a:p>
             <a:fld id="{FEFA0557-7C35-4D1D-B97A-95898D157B33}" type="datetimeFigureOut">
               <a:rPr lang="en-US" smtClean="0"/>
-              <a:t>6/27/2019</a:t>
+              <a:t>6/25/2019</a:t>
             </a:fld>
             <a:endParaRPr lang="en-US"/>
           </a:p>
@@ -4937,7 +4936,7 @@
           <a:p>
             <a:fld id="{B236AB90-F632-4852-BC4B-53E103869F3D}" type="datetimeFigureOut">
               <a:rPr lang="en-US" smtClean="0"/>
-              <a:t>6/27/2019</a:t>
+              <a:t>6/25/2019</a:t>
             </a:fld>
             <a:endParaRPr lang="en-US"/>
           </a:p>
@@ -5323,7 +5322,7 @@
           <a:p>
             <a:fld id="{12374C44-A702-4728-BB40-76FE555B9CF1}" type="datetimeFigureOut">
               <a:rPr lang="en-US" smtClean="0"/>
-              <a:t>6/27/2019</a:t>
+              <a:t>6/25/2019</a:t>
             </a:fld>
             <a:endParaRPr lang="en-US"/>
           </a:p>
@@ -5536,7 +5535,7 @@
           <a:p>
             <a:fld id="{E1F32DF0-702E-431A-ADCF-2A06AC4E7F57}" type="datetimeFigureOut">
               <a:rPr lang="en-US" smtClean="0"/>
-              <a:t>6/27/2019</a:t>
+              <a:t>6/25/2019</a:t>
             </a:fld>
             <a:endParaRPr lang="en-US"/>
           </a:p>
@@ -5840,7 +5839,7 @@
           <a:p>
             <a:fld id="{DBDC1F8B-7509-4E85-ABDB-3F1EEA772746}" type="datetimeFigureOut">
               <a:rPr lang="en-US" smtClean="0"/>
-              <a:t>6/27/2019</a:t>
+              <a:t>6/25/2019</a:t>
             </a:fld>
             <a:endParaRPr lang="en-US"/>
           </a:p>
@@ -6132,7 +6131,7 @@
           <a:p>
             <a:fld id="{52C5D9E0-CA9E-46E5-9606-B0D66E683FEE}" type="datetimeFigureOut">
               <a:rPr lang="en-US" smtClean="0"/>
-              <a:t>6/27/2019</a:t>
+              <a:t>6/25/2019</a:t>
             </a:fld>
             <a:endParaRPr lang="en-US"/>
           </a:p>
@@ -6706,7 +6705,7 @@
           <a:p>
             <a:fld id="{5BA37E64-D101-4693-B362-74BB0158B47B}" type="datetimeFigureOut">
               <a:rPr lang="en-US" smtClean="0"/>
-              <a:t>6/27/2019</a:t>
+              <a:t>6/25/2019</a:t>
             </a:fld>
             <a:endParaRPr lang="en-US"/>
           </a:p>
@@ -6882,7 +6881,7 @@
           <a:p>
             <a:fld id="{FACA2033-B529-4F88-BF0F-C9E77C7AF715}" type="datetimeFigureOut">
               <a:rPr lang="en-US" smtClean="0"/>
-              <a:t>6/27/2019</a:t>
+              <a:t>6/25/2019</a:t>
             </a:fld>
             <a:endParaRPr lang="en-US"/>
           </a:p>
@@ -7522,7 +7521,7 @@
           <a:p>
             <a:fld id="{2F850279-8577-4DB5-A1B1-2A1239DFFE30}" type="datetimeFigureOut">
               <a:rPr lang="en-US" smtClean="0"/>
-              <a:t>6/27/2019</a:t>
+              <a:t>6/25/2019</a:t>
             </a:fld>
             <a:endParaRPr lang="en-US"/>
           </a:p>
@@ -8707,8 +8706,8 @@
         </p:nvSpPr>
         <p:spPr>
           <a:xfrm>
-            <a:off x="261013" y="152400"/>
-            <a:ext cx="8229600" cy="838200"/>
+            <a:off x="292100" y="533400"/>
+            <a:ext cx="8229600" cy="1371600"/>
           </a:xfrm>
           <a:prstGeom prst="rect">
             <a:avLst/>
@@ -8724,11 +8723,22 @@
           </a:bodyPr>
           <a:lstStyle/>
           <a:p>
-            <a:pPr lvl="0" algn="ctr">
+            <a:pPr marL="0" marR="0" lvl="0" indent="0" algn="ctr" rtl="0">
+              <a:lnSpc>
+                <a:spcPct val="100000"/>
+              </a:lnSpc>
+              <a:spcBef>
+                <a:spcPts val="0"/>
+              </a:spcBef>
+              <a:spcAft>
+                <a:spcPts val="0"/>
+              </a:spcAft>
               <a:buClr>
                 <a:schemeClr val="dk2"/>
               </a:buClr>
               <a:buSzPct val="25000"/>
+              <a:buFont typeface="Arial"/>
+              <a:buNone/>
             </a:pPr>
             <a:r>
               <a:rPr lang="en-US" sz="4400" b="0" i="0" u="none" strike="noStrike" cap="none" dirty="0" smtClean="0">
@@ -8740,7 +8750,7 @@
                 <a:cs typeface="Arial"/>
                 <a:sym typeface="Arial"/>
               </a:rPr>
-              <a:t>Questions?</a:t>
+              <a:t>Question?</a:t>
             </a:r>
             <a:r>
               <a:rPr lang="en-US" sz="4400" dirty="0" smtClean="0"/>
@@ -8758,51 +8768,37 @@
             </a:br>
             <a:r>
               <a:rPr lang="en-US" sz="4400" dirty="0" smtClean="0"/>
-              <a:t>Summary</a:t>
+              <a:t/>
             </a:r>
             <a:br>
               <a:rPr lang="en-US" sz="4400" dirty="0" smtClean="0"/>
             </a:br>
             <a:r>
-              <a:rPr lang="en-US" sz="4400" dirty="0"/>
-              <a:t/>
-            </a:r>
-            <a:br>
-              <a:rPr lang="en-US" sz="4400" dirty="0"/>
-            </a:br>
-            <a:r>
               <a:rPr lang="en-US" sz="4400" dirty="0" smtClean="0"/>
-              <a:t>Ilya </a:t>
-            </a:r>
-            <a:r>
-              <a:rPr lang="en-US" sz="4400" dirty="0" smtClean="0"/>
-              <a:t>Rokhkin (Git Trainings</a:t>
-            </a:r>
-            <a:r>
-              <a:rPr lang="en-US" sz="4400" dirty="0" smtClean="0"/>
-              <a:t>)</a:t>
+              <a:t>Ilya Rokhkin (Git Trainings)</a:t>
             </a:r>
             <a:br>
               <a:rPr lang="en-US" sz="4400" dirty="0" smtClean="0"/>
             </a:br>
             <a:r>
-              <a:rPr lang="en-US" sz="2800" dirty="0">
+              <a:rPr lang="en-US" sz="4400" dirty="0" smtClean="0">
                 <a:hlinkClick r:id="rId3"/>
               </a:rPr>
-              <a:t>https://</a:t>
+              <a:t>rokhkin_ilya@yahoo.com</a:t>
             </a:r>
             <a:r>
-              <a:rPr lang="en-US" sz="2800" dirty="0" smtClean="0">
-                <a:hlinkClick r:id="rId3"/>
-              </a:rPr>
-              <a:t>github.com/ilyaro/git_best_practices_ppt</a:t>
-            </a:r>
-            <a:r>
-              <a:rPr lang="en-US" sz="2800" dirty="0" smtClean="0"/>
+              <a:rPr lang="en-US" sz="4400" dirty="0" smtClean="0"/>
               <a:t/>
             </a:r>
             <a:br>
-              <a:rPr lang="en-US" sz="2800" dirty="0" smtClean="0"/>
+              <a:rPr lang="en-US" sz="4400" dirty="0" smtClean="0"/>
+            </a:br>
+            <a:r>
+              <a:rPr lang="en-US" sz="4400" dirty="0" smtClean="0"/>
+              <a:t>054-5224805</a:t>
+            </a:r>
+            <a:br>
+              <a:rPr lang="en-US" sz="4400" dirty="0" smtClean="0"/>
             </a:br>
             <a:r>
               <a:rPr lang="en-US" sz="4400" dirty="0" smtClean="0"/>
@@ -8812,32 +8808,9 @@
               <a:rPr lang="en-US" sz="4400" dirty="0" smtClean="0"/>
             </a:br>
             <a:r>
-              <a:rPr lang="en-US" sz="4000" dirty="0" smtClean="0">
-                <a:hlinkClick r:id="rId4"/>
-              </a:rPr>
-              <a:t>rokhkin_ilya@yahoo.com</a:t>
+              <a:rPr lang="en-US" sz="4400" dirty="0" smtClean="0"/>
+              <a:t>Thanks!</a:t>
             </a:r>
-            <a:r>
-              <a:rPr lang="en-US" sz="4000" dirty="0" smtClean="0"/>
-              <a:t/>
-            </a:r>
-            <a:br>
-              <a:rPr lang="en-US" sz="4000" dirty="0" smtClean="0"/>
-            </a:br>
-            <a:r>
-              <a:rPr lang="en-US" sz="4000" dirty="0" smtClean="0"/>
-              <a:t>054-5224805</a:t>
-            </a:r>
-            <a:br>
-              <a:rPr lang="en-US" sz="4000" dirty="0" smtClean="0"/>
-            </a:br>
-            <a:r>
-              <a:rPr lang="en-US" sz="4400" dirty="0" smtClean="0"/>
-              <a:t/>
-            </a:r>
-            <a:br>
-              <a:rPr lang="en-US" sz="4400" dirty="0" smtClean="0"/>
-            </a:br>
             <a:endParaRPr lang="en-US" sz="4400" dirty="0"/>
           </a:p>
         </p:txBody>
@@ -9007,148 +8980,6 @@
     <p:extLst>
       <p:ext uri="{BB962C8B-B14F-4D97-AF65-F5344CB8AC3E}">
         <p14:creationId xmlns:p14="http://schemas.microsoft.com/office/powerpoint/2010/main" val="1066355941"/>
-      </p:ext>
-    </p:extLst>
-  </p:cSld>
-  <p:clrMapOvr>
-    <a:masterClrMapping/>
-  </p:clrMapOvr>
-</p:sld>
-</file>
-
-<file path=ppt/slides/slide12.xml><?xml version="1.0" encoding="utf-8"?>
-<p:sld xmlns:a="http://schemas.openxmlformats.org/drawingml/2006/main" xmlns:r="http://schemas.openxmlformats.org/officeDocument/2006/relationships" xmlns:p="http://schemas.openxmlformats.org/presentationml/2006/main">
-  <p:cSld>
-    <p:spTree>
-      <p:nvGrpSpPr>
-        <p:cNvPr id="1" name=""/>
-        <p:cNvGrpSpPr/>
-        <p:nvPr/>
-      </p:nvGrpSpPr>
-      <p:grpSpPr>
-        <a:xfrm>
-          <a:off x="0" y="0"/>
-          <a:ext cx="0" cy="0"/>
-          <a:chOff x="0" y="0"/>
-          <a:chExt cx="0" cy="0"/>
-        </a:xfrm>
-      </p:grpSpPr>
-      <p:sp>
-        <p:nvSpPr>
-          <p:cNvPr id="2" name="Title 1"/>
-          <p:cNvSpPr>
-            <a:spLocks noGrp="1"/>
-          </p:cNvSpPr>
-          <p:nvPr>
-            <p:ph type="title"/>
-          </p:nvPr>
-        </p:nvSpPr>
-        <p:spPr/>
-        <p:txBody>
-          <a:bodyPr/>
-          <a:lstStyle/>
-          <a:p>
-            <a:pPr algn="ctr"/>
-            <a:r>
-              <a:rPr lang="en-US" dirty="0" smtClean="0"/>
-              <a:t>Git Best Practices</a:t>
-            </a:r>
-            <a:endParaRPr lang="en-US" dirty="0"/>
-          </a:p>
-        </p:txBody>
-      </p:sp>
-      <p:sp>
-        <p:nvSpPr>
-          <p:cNvPr id="3" name="Text Placeholder 2"/>
-          <p:cNvSpPr>
-            <a:spLocks noGrp="1"/>
-          </p:cNvSpPr>
-          <p:nvPr>
-            <p:ph type="body" idx="1"/>
-          </p:nvPr>
-        </p:nvSpPr>
-        <p:spPr/>
-        <p:txBody>
-          <a:bodyPr/>
-          <a:lstStyle/>
-          <a:p>
-            <a:pPr marL="127000" indent="0" algn="ctr">
-              <a:buNone/>
-            </a:pPr>
-            <a:endParaRPr lang="en-US" sz="4800" dirty="0" smtClean="0"/>
-          </a:p>
-          <a:p>
-            <a:pPr marL="127000" indent="0" algn="ctr">
-              <a:buNone/>
-            </a:pPr>
-            <a:r>
-              <a:rPr lang="en-US" sz="4800" dirty="0" smtClean="0"/>
-              <a:t>Thank You!</a:t>
-            </a:r>
-            <a:endParaRPr lang="en-US" sz="4800" dirty="0"/>
-          </a:p>
-        </p:txBody>
-      </p:sp>
-      <p:sp>
-        <p:nvSpPr>
-          <p:cNvPr id="4" name="Slide Number Placeholder 3"/>
-          <p:cNvSpPr>
-            <a:spLocks noGrp="1"/>
-          </p:cNvSpPr>
-          <p:nvPr>
-            <p:ph type="sldNum" idx="12"/>
-          </p:nvPr>
-        </p:nvSpPr>
-        <p:spPr/>
-        <p:txBody>
-          <a:bodyPr/>
-          <a:lstStyle/>
-          <a:p>
-            <a:pPr marL="0" marR="0" lvl="0" indent="0" algn="r" rtl="0">
-              <a:lnSpc>
-                <a:spcPct val="100000"/>
-              </a:lnSpc>
-              <a:spcBef>
-                <a:spcPts val="0"/>
-              </a:spcBef>
-              <a:spcAft>
-                <a:spcPts val="0"/>
-              </a:spcAft>
-              <a:buClr>
-                <a:schemeClr val="lt2"/>
-              </a:buClr>
-              <a:buSzPct val="25000"/>
-              <a:buFont typeface="Arial"/>
-              <a:buNone/>
-            </a:pPr>
-            <a:fld id="{00000000-1234-1234-1234-123412341234}" type="slidenum">
-              <a:rPr lang="en-US" sz="700" b="0" i="0" u="none" smtClean="0">
-                <a:solidFill>
-                  <a:schemeClr val="lt2"/>
-                </a:solidFill>
-                <a:latin typeface="Arial"/>
-                <a:ea typeface="Arial"/>
-                <a:cs typeface="Arial"/>
-                <a:sym typeface="Arial"/>
-              </a:rPr>
-              <a:t>12</a:t>
-            </a:fld>
-            <a:endParaRPr lang="en-US" sz="700" b="0" i="0" u="none">
-              <a:solidFill>
-                <a:schemeClr val="lt2"/>
-              </a:solidFill>
-              <a:latin typeface="Arial"/>
-              <a:ea typeface="Arial"/>
-              <a:cs typeface="Arial"/>
-              <a:sym typeface="Arial"/>
-            </a:endParaRPr>
-          </a:p>
-        </p:txBody>
-      </p:sp>
-    </p:spTree>
-    <p:extLst>
-      <p:ext uri="{BB962C8B-B14F-4D97-AF65-F5344CB8AC3E}">
-        <p14:creationId xmlns:p14="http://schemas.microsoft.com/office/powerpoint/2010/main" val="21745747"/>
       </p:ext>
     </p:extLst>
   </p:cSld>
@@ -10585,7 +10416,11 @@
           <a:p>
             <a:r>
               <a:rPr lang="en-US" sz="2400" dirty="0" smtClean="0"/>
-              <a:t>Demo: git merge --squash</a:t>
+              <a:t>Demo: git </a:t>
+            </a:r>
+            <a:r>
+              <a:rPr lang="en-US" sz="2400" dirty="0" smtClean="0"/>
+              <a:t>merge --squash</a:t>
             </a:r>
             <a:endParaRPr lang="en-US" sz="2400" dirty="0"/>
           </a:p>
@@ -11064,13 +10899,41 @@
           <a:p>
             <a:r>
               <a:rPr lang="en-US" sz="2400" dirty="0" smtClean="0"/>
-              <a:t>Limit commit message Subject to 70 chars and it must be simple, clear, self explained – this is the line all will see!</a:t>
+              <a:t>Limit commit message </a:t>
             </a:r>
-          </a:p>
-          <a:p>
             <a:r>
               <a:rPr lang="en-US" sz="2400" dirty="0" smtClean="0"/>
-              <a:t>Meaningful details put in the body of the commit message</a:t>
+              <a:t>Subject </a:t>
+            </a:r>
+            <a:r>
+              <a:rPr lang="en-US" sz="2400" dirty="0" smtClean="0"/>
+              <a:t>to 70 chars and it must be simple, clear, self explained – this is the line all will see!</a:t>
+            </a:r>
+          </a:p>
+          <a:p>
+            <a:r>
+              <a:rPr lang="en-US" sz="2400" dirty="0" smtClean="0"/>
+              <a:t>Meaningful details </a:t>
+            </a:r>
+            <a:r>
+              <a:rPr lang="en-US" sz="2400" dirty="0" smtClean="0"/>
+              <a:t>put in </a:t>
+            </a:r>
+            <a:r>
+              <a:rPr lang="en-US" sz="2400" dirty="0" smtClean="0"/>
+              <a:t>the </a:t>
+            </a:r>
+            <a:r>
+              <a:rPr lang="en-US" sz="2400" dirty="0" smtClean="0"/>
+              <a:t>body of </a:t>
+            </a:r>
+            <a:r>
+              <a:rPr lang="en-US" sz="2400" dirty="0" smtClean="0"/>
+              <a:t>the </a:t>
+            </a:r>
+            <a:r>
+              <a:rPr lang="en-US" sz="2400" dirty="0" smtClean="0"/>
+              <a:t>commit message</a:t>
             </a:r>
             <a:endParaRPr lang="en-US" sz="2400" dirty="0"/>
           </a:p>

</xml_diff>